<commit_message>
Fix Q1 and Q2 based on feedback
Issue #1 - Question 1:
- Display all 5 shapes once at top with labels (Box, Pot, Shaker, Cabbage, Hat)
- Show shapes in correct answer order as visual hint
- Answer options now show text labels only (no redundant shape icons)
- Saves space and makes it clearer for 7-year-old

Issue #2 - Question 2:
- Redesigned Answer B to look like a cat
- Cat now has: circle head, two triangle ears, rectangular body, four legs
- Matches reference image design from worksheets
</commit_message>
<xml_diff>
--- a/math-shapes-quiz-test.pptx
+++ b/math-shapes-quiz-test.pptx
@@ -1218,14 +1218,89 @@
       </p:sp>
       <p:sp>
         <p:nvSpPr>
-          <p:cNvPr id="4" name="Text 2"/>
-          <p:cNvSpPr/>
-          <p:nvPr/>
-        </p:nvSpPr>
-        <p:spPr>
-          <a:xfrm>
-            <a:off x="914400" y="914400"/>
-            <a:ext cx="7315200" cy="274320"/>
+          <p:cNvPr id="4" name="Shape 2"/>
+          <p:cNvSpPr/>
+          <p:nvPr/>
+        </p:nvSpPr>
+        <p:spPr>
+          <a:xfrm>
+            <a:off x="640080" y="1097280"/>
+            <a:ext cx="457200" cy="320040"/>
+          </a:xfrm>
+          <a:prstGeom prst="rect">
+            <a:avLst/>
+          </a:prstGeom>
+          <a:solidFill>
+            <a:srgbClr val="66B3FF"/>
+          </a:solidFill>
+          <a:ln w="12700">
+            <a:solidFill>
+              <a:srgbClr val="000000"/>
+            </a:solidFill>
+            <a:prstDash val="solid"/>
+          </a:ln>
+        </p:spPr>
+      </p:sp>
+      <p:sp>
+        <p:nvSpPr>
+          <p:cNvPr id="5" name="Shape 3"/>
+          <p:cNvSpPr/>
+          <p:nvPr/>
+        </p:nvSpPr>
+        <p:spPr>
+          <a:xfrm>
+            <a:off x="822960" y="914400"/>
+            <a:ext cx="457200" cy="182880"/>
+          </a:xfrm>
+          <a:prstGeom prst="rect">
+            <a:avLst/>
+          </a:prstGeom>
+          <a:solidFill>
+            <a:srgbClr val="99E6FF"/>
+          </a:solidFill>
+          <a:ln w="12700">
+            <a:solidFill>
+              <a:srgbClr val="000000"/>
+            </a:solidFill>
+            <a:prstDash val="solid"/>
+          </a:ln>
+        </p:spPr>
+      </p:sp>
+      <p:sp>
+        <p:nvSpPr>
+          <p:cNvPr id="6" name="Shape 4"/>
+          <p:cNvSpPr/>
+          <p:nvPr/>
+        </p:nvSpPr>
+        <p:spPr>
+          <a:xfrm>
+            <a:off x="1097280" y="1097280"/>
+            <a:ext cx="182880" cy="320040"/>
+          </a:xfrm>
+          <a:prstGeom prst="rect">
+            <a:avLst/>
+          </a:prstGeom>
+          <a:solidFill>
+            <a:srgbClr val="3380CC"/>
+          </a:solidFill>
+          <a:ln w="12700">
+            <a:solidFill>
+              <a:srgbClr val="000000"/>
+            </a:solidFill>
+            <a:prstDash val="solid"/>
+          </a:ln>
+        </p:spPr>
+      </p:sp>
+      <p:sp>
+        <p:nvSpPr>
+          <p:cNvPr id="7" name="Text 5"/>
+          <p:cNvSpPr/>
+          <p:nvPr/>
+        </p:nvSpPr>
+        <p:spPr>
+          <a:xfrm>
+            <a:off x="640080" y="1463040"/>
+            <a:ext cx="640080" cy="182880"/>
           </a:xfrm>
           <a:prstGeom prst="rect">
             <a:avLst/>
@@ -1241,27 +1316,444 @@
               <a:buNone/>
             </a:pPr>
             <a:r>
-              <a:rPr lang="en-US" sz="1200" i="1" dirty="0">
+              <a:rPr lang="en-US" sz="1000" dirty="0">
                 <a:solidFill>
                   <a:srgbClr val="E0E0E0"/>
                 </a:solidFill>
               </a:rPr>
-              <a:t>Box | Pot | Shaker | Cabbage | Hat</a:t>
-            </a:r>
-            <a:endParaRPr lang="en-US" sz="1200" dirty="0"/>
-          </a:p>
-        </p:txBody>
-      </p:sp>
-      <p:sp>
-        <p:nvSpPr>
-          <p:cNvPr id="5" name="Shape 3"/>
-          <p:cNvSpPr/>
-          <p:nvPr/>
-        </p:nvSpPr>
-        <p:spPr>
-          <a:xfrm>
-            <a:off x="457200" y="1371600"/>
-            <a:ext cx="3840480" cy="1005840"/>
+              <a:t>Box</a:t>
+            </a:r>
+            <a:endParaRPr lang="en-US" sz="1000" dirty="0"/>
+          </a:p>
+        </p:txBody>
+      </p:sp>
+      <p:sp>
+        <p:nvSpPr>
+          <p:cNvPr id="8" name="Shape 6"/>
+          <p:cNvSpPr/>
+          <p:nvPr/>
+        </p:nvSpPr>
+        <p:spPr>
+          <a:xfrm>
+            <a:off x="2103120" y="868680"/>
+            <a:ext cx="411480" cy="123444"/>
+          </a:xfrm>
+          <a:prstGeom prst="ellipse">
+            <a:avLst/>
+          </a:prstGeom>
+          <a:solidFill>
+            <a:srgbClr val="99E6FF"/>
+          </a:solidFill>
+          <a:ln w="12700">
+            <a:solidFill>
+              <a:srgbClr val="000000"/>
+            </a:solidFill>
+            <a:prstDash val="solid"/>
+          </a:ln>
+        </p:spPr>
+      </p:sp>
+      <p:sp>
+        <p:nvSpPr>
+          <p:cNvPr id="9" name="Shape 7"/>
+          <p:cNvSpPr/>
+          <p:nvPr/>
+        </p:nvSpPr>
+        <p:spPr>
+          <a:xfrm>
+            <a:off x="2103120" y="930402"/>
+            <a:ext cx="411480" cy="365760"/>
+          </a:xfrm>
+          <a:prstGeom prst="rect">
+            <a:avLst/>
+          </a:prstGeom>
+          <a:solidFill>
+            <a:srgbClr val="66B3FF"/>
+          </a:solidFill>
+          <a:ln w="12700">
+            <a:solidFill>
+              <a:srgbClr val="000000"/>
+            </a:solidFill>
+            <a:prstDash val="solid"/>
+          </a:ln>
+        </p:spPr>
+      </p:sp>
+      <p:sp>
+        <p:nvSpPr>
+          <p:cNvPr id="10" name="Shape 8"/>
+          <p:cNvSpPr/>
+          <p:nvPr/>
+        </p:nvSpPr>
+        <p:spPr>
+          <a:xfrm>
+            <a:off x="2103120" y="1234440"/>
+            <a:ext cx="411480" cy="123444"/>
+          </a:xfrm>
+          <a:prstGeom prst="ellipse">
+            <a:avLst/>
+          </a:prstGeom>
+          <a:solidFill>
+            <a:srgbClr val="4C99E5"/>
+          </a:solidFill>
+          <a:ln w="12700">
+            <a:solidFill>
+              <a:srgbClr val="000000"/>
+            </a:solidFill>
+            <a:prstDash val="solid"/>
+          </a:ln>
+        </p:spPr>
+      </p:sp>
+      <p:sp>
+        <p:nvSpPr>
+          <p:cNvPr id="11" name="Shape 9"/>
+          <p:cNvSpPr/>
+          <p:nvPr/>
+        </p:nvSpPr>
+        <p:spPr>
+          <a:xfrm>
+            <a:off x="2103120" y="930402"/>
+            <a:ext cx="0" cy="365760"/>
+          </a:xfrm>
+          <a:prstGeom prst="line">
+            <a:avLst/>
+          </a:prstGeom>
+          <a:noFill/>
+          <a:ln w="12700">
+            <a:solidFill>
+              <a:srgbClr val="000000"/>
+            </a:solidFill>
+            <a:prstDash val="solid"/>
+          </a:ln>
+        </p:spPr>
+      </p:sp>
+      <p:sp>
+        <p:nvSpPr>
+          <p:cNvPr id="12" name="Shape 10"/>
+          <p:cNvSpPr/>
+          <p:nvPr/>
+        </p:nvSpPr>
+        <p:spPr>
+          <a:xfrm>
+            <a:off x="2514600" y="930402"/>
+            <a:ext cx="0" cy="365760"/>
+          </a:xfrm>
+          <a:prstGeom prst="line">
+            <a:avLst/>
+          </a:prstGeom>
+          <a:noFill/>
+          <a:ln w="12700">
+            <a:solidFill>
+              <a:srgbClr val="000000"/>
+            </a:solidFill>
+            <a:prstDash val="solid"/>
+          </a:ln>
+        </p:spPr>
+      </p:sp>
+      <p:sp>
+        <p:nvSpPr>
+          <p:cNvPr id="13" name="Text 11"/>
+          <p:cNvSpPr/>
+          <p:nvPr/>
+        </p:nvSpPr>
+        <p:spPr>
+          <a:xfrm>
+            <a:off x="2103120" y="1403604"/>
+            <a:ext cx="411480" cy="182880"/>
+          </a:xfrm>
+          <a:prstGeom prst="rect">
+            <a:avLst/>
+          </a:prstGeom>
+          <a:noFill/>
+          <a:ln/>
+        </p:spPr>
+        <p:txBody>
+          <a:bodyPr wrap="square" rtlCol="0" anchor="ctr"/>
+          <a:lstStyle/>
+          <a:p>
+            <a:pPr algn="ctr" indent="0" marL="0">
+              <a:buNone/>
+            </a:pPr>
+            <a:r>
+              <a:rPr lang="en-US" sz="1000" dirty="0">
+                <a:solidFill>
+                  <a:srgbClr val="E0E0E0"/>
+                </a:solidFill>
+              </a:rPr>
+              <a:t>Pot</a:t>
+            </a:r>
+            <a:endParaRPr lang="en-US" sz="1000" dirty="0"/>
+          </a:p>
+        </p:txBody>
+      </p:sp>
+      <p:sp>
+        <p:nvSpPr>
+          <p:cNvPr id="14" name="Shape 12"/>
+          <p:cNvSpPr/>
+          <p:nvPr/>
+        </p:nvSpPr>
+        <p:spPr>
+          <a:xfrm>
+            <a:off x="3566160" y="1234440"/>
+            <a:ext cx="411480" cy="123444"/>
+          </a:xfrm>
+          <a:prstGeom prst="ellipse">
+            <a:avLst/>
+          </a:prstGeom>
+          <a:solidFill>
+            <a:srgbClr val="4C99E5"/>
+          </a:solidFill>
+          <a:ln w="12700">
+            <a:solidFill>
+              <a:srgbClr val="000000"/>
+            </a:solidFill>
+            <a:prstDash val="solid"/>
+          </a:ln>
+        </p:spPr>
+      </p:sp>
+      <p:sp>
+        <p:nvSpPr>
+          <p:cNvPr id="15" name="Shape 13"/>
+          <p:cNvSpPr/>
+          <p:nvPr/>
+        </p:nvSpPr>
+        <p:spPr>
+          <a:xfrm flipV="1">
+            <a:off x="3566160" y="868680"/>
+            <a:ext cx="411480" cy="365760"/>
+          </a:xfrm>
+          <a:prstGeom prst="triangle">
+            <a:avLst/>
+          </a:prstGeom>
+          <a:solidFill>
+            <a:srgbClr val="66B3FF"/>
+          </a:solidFill>
+          <a:ln w="12700">
+            <a:solidFill>
+              <a:srgbClr val="000000"/>
+            </a:solidFill>
+            <a:prstDash val="solid"/>
+          </a:ln>
+        </p:spPr>
+      </p:sp>
+      <p:sp>
+        <p:nvSpPr>
+          <p:cNvPr id="16" name="Text 14"/>
+          <p:cNvSpPr/>
+          <p:nvPr/>
+        </p:nvSpPr>
+        <p:spPr>
+          <a:xfrm>
+            <a:off x="3566160" y="1403604"/>
+            <a:ext cx="411480" cy="182880"/>
+          </a:xfrm>
+          <a:prstGeom prst="rect">
+            <a:avLst/>
+          </a:prstGeom>
+          <a:noFill/>
+          <a:ln/>
+        </p:spPr>
+        <p:txBody>
+          <a:bodyPr wrap="square" rtlCol="0" anchor="ctr"/>
+          <a:lstStyle/>
+          <a:p>
+            <a:pPr algn="ctr" indent="0" marL="0">
+              <a:buNone/>
+            </a:pPr>
+            <a:r>
+              <a:rPr lang="en-US" sz="1000" dirty="0">
+                <a:solidFill>
+                  <a:srgbClr val="E0E0E0"/>
+                </a:solidFill>
+              </a:rPr>
+              <a:t>Shaker</a:t>
+            </a:r>
+            <a:endParaRPr lang="en-US" sz="1000" dirty="0"/>
+          </a:p>
+        </p:txBody>
+      </p:sp>
+      <p:sp>
+        <p:nvSpPr>
+          <p:cNvPr id="17" name="Shape 15"/>
+          <p:cNvSpPr/>
+          <p:nvPr/>
+        </p:nvSpPr>
+        <p:spPr>
+          <a:xfrm>
+            <a:off x="5029200" y="914400"/>
+            <a:ext cx="411480" cy="411480"/>
+          </a:xfrm>
+          <a:prstGeom prst="ellipse">
+            <a:avLst/>
+          </a:prstGeom>
+          <a:solidFill>
+            <a:srgbClr val="66B3FF"/>
+          </a:solidFill>
+          <a:ln w="12700">
+            <a:solidFill>
+              <a:srgbClr val="000000"/>
+            </a:solidFill>
+            <a:prstDash val="solid"/>
+          </a:ln>
+        </p:spPr>
+      </p:sp>
+      <p:sp>
+        <p:nvSpPr>
+          <p:cNvPr id="18" name="Shape 16"/>
+          <p:cNvSpPr/>
+          <p:nvPr/>
+        </p:nvSpPr>
+        <p:spPr>
+          <a:xfrm>
+            <a:off x="5090922" y="976122"/>
+            <a:ext cx="123444" cy="123444"/>
+          </a:xfrm>
+          <a:prstGeom prst="ellipse">
+            <a:avLst/>
+          </a:prstGeom>
+          <a:solidFill>
+            <a:srgbClr val="B3FFFF">
+              <a:alpha val="50000"/>
+            </a:srgbClr>
+          </a:solidFill>
+          <a:ln w="12700">
+            <a:solidFill>
+              <a:srgbClr val="333333"/>
+            </a:solidFill>
+            <a:prstDash val="solid"/>
+          </a:ln>
+        </p:spPr>
+      </p:sp>
+      <p:sp>
+        <p:nvSpPr>
+          <p:cNvPr id="19" name="Text 17"/>
+          <p:cNvSpPr/>
+          <p:nvPr/>
+        </p:nvSpPr>
+        <p:spPr>
+          <a:xfrm>
+            <a:off x="5029200" y="1371600"/>
+            <a:ext cx="411480" cy="182880"/>
+          </a:xfrm>
+          <a:prstGeom prst="rect">
+            <a:avLst/>
+          </a:prstGeom>
+          <a:noFill/>
+          <a:ln/>
+        </p:spPr>
+        <p:txBody>
+          <a:bodyPr wrap="square" rtlCol="0" anchor="ctr"/>
+          <a:lstStyle/>
+          <a:p>
+            <a:pPr algn="ctr" indent="0" marL="0">
+              <a:buNone/>
+            </a:pPr>
+            <a:r>
+              <a:rPr lang="en-US" sz="1000" dirty="0">
+                <a:solidFill>
+                  <a:srgbClr val="E0E0E0"/>
+                </a:solidFill>
+              </a:rPr>
+              <a:t>Cabbage</a:t>
+            </a:r>
+            <a:endParaRPr lang="en-US" sz="1000" dirty="0"/>
+          </a:p>
+        </p:txBody>
+      </p:sp>
+      <p:sp>
+        <p:nvSpPr>
+          <p:cNvPr id="20" name="Shape 18"/>
+          <p:cNvSpPr/>
+          <p:nvPr/>
+        </p:nvSpPr>
+        <p:spPr>
+          <a:xfrm>
+            <a:off x="6492240" y="1234440"/>
+            <a:ext cx="411480" cy="123444"/>
+          </a:xfrm>
+          <a:prstGeom prst="ellipse">
+            <a:avLst/>
+          </a:prstGeom>
+          <a:solidFill>
+            <a:srgbClr val="4C99E5"/>
+          </a:solidFill>
+          <a:ln w="12700">
+            <a:solidFill>
+              <a:srgbClr val="000000"/>
+            </a:solidFill>
+            <a:prstDash val="solid"/>
+          </a:ln>
+        </p:spPr>
+      </p:sp>
+      <p:sp>
+        <p:nvSpPr>
+          <p:cNvPr id="21" name="Shape 19"/>
+          <p:cNvSpPr/>
+          <p:nvPr/>
+        </p:nvSpPr>
+        <p:spPr>
+          <a:xfrm flipV="1">
+            <a:off x="6492240" y="868680"/>
+            <a:ext cx="411480" cy="365760"/>
+          </a:xfrm>
+          <a:prstGeom prst="triangle">
+            <a:avLst/>
+          </a:prstGeom>
+          <a:solidFill>
+            <a:srgbClr val="66B3FF"/>
+          </a:solidFill>
+          <a:ln w="12700">
+            <a:solidFill>
+              <a:srgbClr val="000000"/>
+            </a:solidFill>
+            <a:prstDash val="solid"/>
+          </a:ln>
+        </p:spPr>
+      </p:sp>
+      <p:sp>
+        <p:nvSpPr>
+          <p:cNvPr id="22" name="Text 20"/>
+          <p:cNvSpPr/>
+          <p:nvPr/>
+        </p:nvSpPr>
+        <p:spPr>
+          <a:xfrm>
+            <a:off x="6492240" y="1403604"/>
+            <a:ext cx="411480" cy="182880"/>
+          </a:xfrm>
+          <a:prstGeom prst="rect">
+            <a:avLst/>
+          </a:prstGeom>
+          <a:noFill/>
+          <a:ln/>
+        </p:spPr>
+        <p:txBody>
+          <a:bodyPr wrap="square" rtlCol="0" anchor="ctr"/>
+          <a:lstStyle/>
+          <a:p>
+            <a:pPr algn="ctr" indent="0" marL="0">
+              <a:buNone/>
+            </a:pPr>
+            <a:r>
+              <a:rPr lang="en-US" sz="1000" dirty="0">
+                <a:solidFill>
+                  <a:srgbClr val="E0E0E0"/>
+                </a:solidFill>
+              </a:rPr>
+              <a:t>Hat</a:t>
+            </a:r>
+            <a:endParaRPr lang="en-US" sz="1000" dirty="0"/>
+          </a:p>
+        </p:txBody>
+      </p:sp>
+      <p:sp>
+        <p:nvSpPr>
+          <p:cNvPr id="23" name="Shape 21"/>
+          <p:cNvSpPr/>
+          <p:nvPr/>
+        </p:nvSpPr>
+        <p:spPr>
+          <a:xfrm>
+            <a:off x="457200" y="2286000"/>
+            <a:ext cx="3840480" cy="685800"/>
           </a:xfrm>
           <a:prstGeom prst="rect">
             <a:avLst/>
@@ -1279,13 +1771,13 @@
       </p:sp>
       <p:sp>
         <p:nvSpPr>
-          <p:cNvPr id="6" name="Text 4"/>
-          <p:cNvSpPr/>
-          <p:nvPr/>
-        </p:nvSpPr>
-        <p:spPr>
-          <a:xfrm>
-            <a:off x="548640" y="1463040"/>
+          <p:cNvPr id="24" name="Text 22"/>
+          <p:cNvSpPr/>
+          <p:nvPr/>
+        </p:nvSpPr>
+        <p:spPr>
+          <a:xfrm>
+            <a:off x="548640" y="2377440"/>
             <a:ext cx="274320" cy="274320"/>
           </a:xfrm>
           <a:prstGeom prst="rect">
@@ -1317,14 +1809,14 @@
       </p:sp>
       <p:sp>
         <p:nvSpPr>
-          <p:cNvPr id="7" name="Text 5"/>
-          <p:cNvSpPr/>
-          <p:nvPr/>
-        </p:nvSpPr>
-        <p:spPr>
-          <a:xfrm>
-            <a:off x="914400" y="1508760"/>
-            <a:ext cx="3200400" cy="731520"/>
+          <p:cNvPr id="25" name="Text 23"/>
+          <p:cNvSpPr/>
+          <p:nvPr/>
+        </p:nvSpPr>
+        <p:spPr>
+          <a:xfrm>
+            <a:off x="914400" y="2468880"/>
+            <a:ext cx="3200400" cy="365760"/>
           </a:xfrm>
           <a:prstGeom prst="rect">
             <a:avLst/>
@@ -1336,329 +1828,31 @@
           <a:bodyPr wrap="square" rtlCol="0" anchor="ctr"/>
           <a:lstStyle/>
           <a:p>
-            <a:pPr indent="0" marL="0">
+            <a:pPr algn="l" indent="0" marL="0">
               <a:buNone/>
             </a:pPr>
             <a:r>
-              <a:rPr lang="en-US" sz="1100" dirty="0">
+              <a:rPr lang="en-US" sz="1300" dirty="0">
                 <a:solidFill>
                   <a:srgbClr val="E0E0E0"/>
                 </a:solidFill>
               </a:rPr>
-              <a:t>Box=Cube, Pot=Cylinder, Shaker=Cone, Cabbage=Sphere, Hat=Cone</a:t>
-            </a:r>
-            <a:endParaRPr lang="en-US" sz="1100" dirty="0"/>
-          </a:p>
-        </p:txBody>
-      </p:sp>
-      <p:sp>
-        <p:nvSpPr>
-          <p:cNvPr id="8" name="Shape 6"/>
-          <p:cNvSpPr/>
-          <p:nvPr/>
-        </p:nvSpPr>
-        <p:spPr>
-          <a:xfrm>
-            <a:off x="914400" y="1938528"/>
-            <a:ext cx="274320" cy="274320"/>
-          </a:xfrm>
-          <a:prstGeom prst="rect">
-            <a:avLst/>
-          </a:prstGeom>
-          <a:solidFill>
-            <a:srgbClr val="FF9999"/>
-          </a:solidFill>
-          <a:ln w="12700">
-            <a:solidFill>
-              <a:srgbClr val="000000"/>
-            </a:solidFill>
-            <a:prstDash val="solid"/>
-          </a:ln>
-        </p:spPr>
-      </p:sp>
-      <p:sp>
-        <p:nvSpPr>
-          <p:cNvPr id="9" name="Shape 7"/>
-          <p:cNvSpPr/>
-          <p:nvPr/>
-        </p:nvSpPr>
-        <p:spPr>
-          <a:xfrm>
-            <a:off x="1024128" y="1828800"/>
-            <a:ext cx="274320" cy="109728"/>
-          </a:xfrm>
-          <a:prstGeom prst="rect">
-            <a:avLst/>
-          </a:prstGeom>
-          <a:solidFill>
-            <a:srgbClr val="FFCCCC"/>
-          </a:solidFill>
-          <a:ln w="12700">
-            <a:solidFill>
-              <a:srgbClr val="000000"/>
-            </a:solidFill>
-            <a:prstDash val="solid"/>
-          </a:ln>
-        </p:spPr>
-      </p:sp>
-      <p:sp>
-        <p:nvSpPr>
-          <p:cNvPr id="10" name="Shape 8"/>
-          <p:cNvSpPr/>
-          <p:nvPr/>
-        </p:nvSpPr>
-        <p:spPr>
-          <a:xfrm>
-            <a:off x="1188720" y="1938528"/>
-            <a:ext cx="109728" cy="274320"/>
-          </a:xfrm>
-          <a:prstGeom prst="rect">
-            <a:avLst/>
-          </a:prstGeom>
-          <a:solidFill>
-            <a:srgbClr val="CC6666"/>
-          </a:solidFill>
-          <a:ln w="12700">
-            <a:solidFill>
-              <a:srgbClr val="000000"/>
-            </a:solidFill>
-            <a:prstDash val="solid"/>
-          </a:ln>
-        </p:spPr>
-      </p:sp>
-      <p:sp>
-        <p:nvSpPr>
-          <p:cNvPr id="11" name="Shape 9"/>
-          <p:cNvSpPr/>
-          <p:nvPr/>
-        </p:nvSpPr>
-        <p:spPr>
-          <a:xfrm>
-            <a:off x="1371600" y="1783080"/>
-            <a:ext cx="274320" cy="82296"/>
-          </a:xfrm>
-          <a:prstGeom prst="ellipse">
-            <a:avLst/>
-          </a:prstGeom>
-          <a:solidFill>
-            <a:srgbClr val="FFCCCC"/>
-          </a:solidFill>
-          <a:ln w="12700">
-            <a:solidFill>
-              <a:srgbClr val="000000"/>
-            </a:solidFill>
-            <a:prstDash val="solid"/>
-          </a:ln>
-        </p:spPr>
-      </p:sp>
-      <p:sp>
-        <p:nvSpPr>
-          <p:cNvPr id="12" name="Shape 10"/>
-          <p:cNvSpPr/>
-          <p:nvPr/>
-        </p:nvSpPr>
-        <p:spPr>
-          <a:xfrm>
-            <a:off x="1371600" y="1824228"/>
-            <a:ext cx="274320" cy="320040"/>
-          </a:xfrm>
-          <a:prstGeom prst="rect">
-            <a:avLst/>
-          </a:prstGeom>
-          <a:solidFill>
-            <a:srgbClr val="FF9999"/>
-          </a:solidFill>
-          <a:ln w="12700">
-            <a:solidFill>
-              <a:srgbClr val="000000"/>
-            </a:solidFill>
-            <a:prstDash val="solid"/>
-          </a:ln>
-        </p:spPr>
-      </p:sp>
-      <p:sp>
-        <p:nvSpPr>
-          <p:cNvPr id="13" name="Shape 11"/>
-          <p:cNvSpPr/>
-          <p:nvPr/>
-        </p:nvSpPr>
-        <p:spPr>
-          <a:xfrm>
-            <a:off x="1371600" y="2103120"/>
-            <a:ext cx="274320" cy="82296"/>
-          </a:xfrm>
-          <a:prstGeom prst="ellipse">
-            <a:avLst/>
-          </a:prstGeom>
-          <a:solidFill>
-            <a:srgbClr val="E57F7F"/>
-          </a:solidFill>
-          <a:ln w="12700">
-            <a:solidFill>
-              <a:srgbClr val="000000"/>
-            </a:solidFill>
-            <a:prstDash val="solid"/>
-          </a:ln>
-        </p:spPr>
-      </p:sp>
-      <p:sp>
-        <p:nvSpPr>
-          <p:cNvPr id="14" name="Shape 12"/>
-          <p:cNvSpPr/>
-          <p:nvPr/>
-        </p:nvSpPr>
-        <p:spPr>
-          <a:xfrm>
-            <a:off x="1371600" y="1824228"/>
-            <a:ext cx="0" cy="320040"/>
-          </a:xfrm>
-          <a:prstGeom prst="line">
-            <a:avLst/>
-          </a:prstGeom>
-          <a:noFill/>
-          <a:ln w="12700">
-            <a:solidFill>
-              <a:srgbClr val="000000"/>
-            </a:solidFill>
-            <a:prstDash val="solid"/>
-          </a:ln>
-        </p:spPr>
-      </p:sp>
-      <p:sp>
-        <p:nvSpPr>
-          <p:cNvPr id="15" name="Shape 13"/>
-          <p:cNvSpPr/>
-          <p:nvPr/>
-        </p:nvSpPr>
-        <p:spPr>
-          <a:xfrm>
-            <a:off x="1645920" y="1824228"/>
-            <a:ext cx="0" cy="320040"/>
-          </a:xfrm>
-          <a:prstGeom prst="line">
-            <a:avLst/>
-          </a:prstGeom>
-          <a:noFill/>
-          <a:ln w="12700">
-            <a:solidFill>
-              <a:srgbClr val="000000"/>
-            </a:solidFill>
-            <a:prstDash val="solid"/>
-          </a:ln>
-        </p:spPr>
-      </p:sp>
-      <p:sp>
-        <p:nvSpPr>
-          <p:cNvPr id="16" name="Shape 14"/>
-          <p:cNvSpPr/>
-          <p:nvPr/>
-        </p:nvSpPr>
-        <p:spPr>
-          <a:xfrm>
-            <a:off x="1828800" y="2103120"/>
-            <a:ext cx="274320" cy="82296"/>
-          </a:xfrm>
-          <a:prstGeom prst="ellipse">
-            <a:avLst/>
-          </a:prstGeom>
-          <a:solidFill>
-            <a:srgbClr val="E57F7F"/>
-          </a:solidFill>
-          <a:ln w="12700">
-            <a:solidFill>
-              <a:srgbClr val="000000"/>
-            </a:solidFill>
-            <a:prstDash val="solid"/>
-          </a:ln>
-        </p:spPr>
-      </p:sp>
-      <p:sp>
-        <p:nvSpPr>
-          <p:cNvPr id="17" name="Shape 15"/>
-          <p:cNvSpPr/>
-          <p:nvPr/>
-        </p:nvSpPr>
-        <p:spPr>
-          <a:xfrm flipV="1">
-            <a:off x="1828800" y="1783080"/>
-            <a:ext cx="274320" cy="320040"/>
-          </a:xfrm>
-          <a:prstGeom prst="triangle">
-            <a:avLst/>
-          </a:prstGeom>
-          <a:solidFill>
-            <a:srgbClr val="FF9999"/>
-          </a:solidFill>
-          <a:ln w="12700">
-            <a:solidFill>
-              <a:srgbClr val="000000"/>
-            </a:solidFill>
-            <a:prstDash val="solid"/>
-          </a:ln>
-        </p:spPr>
-      </p:sp>
-      <p:sp>
-        <p:nvSpPr>
-          <p:cNvPr id="18" name="Shape 16"/>
-          <p:cNvSpPr/>
-          <p:nvPr/>
-        </p:nvSpPr>
-        <p:spPr>
-          <a:xfrm>
-            <a:off x="2286000" y="1828800"/>
-            <a:ext cx="274320" cy="274320"/>
-          </a:xfrm>
-          <a:prstGeom prst="ellipse">
-            <a:avLst/>
-          </a:prstGeom>
-          <a:solidFill>
-            <a:srgbClr val="FF9999"/>
-          </a:solidFill>
-          <a:ln w="12700">
-            <a:solidFill>
-              <a:srgbClr val="000000"/>
-            </a:solidFill>
-            <a:prstDash val="solid"/>
-          </a:ln>
-        </p:spPr>
-      </p:sp>
-      <p:sp>
-        <p:nvSpPr>
-          <p:cNvPr id="19" name="Shape 17"/>
-          <p:cNvSpPr/>
-          <p:nvPr/>
-        </p:nvSpPr>
-        <p:spPr>
-          <a:xfrm>
-            <a:off x="2327148" y="1869948"/>
-            <a:ext cx="82296" cy="82296"/>
-          </a:xfrm>
-          <a:prstGeom prst="ellipse">
-            <a:avLst/>
-          </a:prstGeom>
-          <a:solidFill>
-            <a:srgbClr val="FFE6E6">
-              <a:alpha val="50000"/>
-            </a:srgbClr>
-          </a:solidFill>
-          <a:ln w="12700">
-            <a:solidFill>
-              <a:srgbClr val="333333"/>
-            </a:solidFill>
-            <a:prstDash val="solid"/>
-          </a:ln>
-        </p:spPr>
-      </p:sp>
-      <p:sp>
-        <p:nvSpPr>
-          <p:cNvPr id="20" name="Shape 18"/>
-          <p:cNvSpPr/>
-          <p:nvPr/>
-        </p:nvSpPr>
-        <p:spPr>
-          <a:xfrm>
-            <a:off x="4754880" y="1371600"/>
-            <a:ext cx="3840480" cy="1005840"/>
+              <a:t>Cube, Cylinder, Cone, Sphere, Cone</a:t>
+            </a:r>
+            <a:endParaRPr lang="en-US" sz="1300" dirty="0"/>
+          </a:p>
+        </p:txBody>
+      </p:sp>
+      <p:sp>
+        <p:nvSpPr>
+          <p:cNvPr id="26" name="Shape 24"/>
+          <p:cNvSpPr/>
+          <p:nvPr/>
+        </p:nvSpPr>
+        <p:spPr>
+          <a:xfrm>
+            <a:off x="4754880" y="2286000"/>
+            <a:ext cx="3840480" cy="685800"/>
           </a:xfrm>
           <a:prstGeom prst="rect">
             <a:avLst/>
@@ -1676,13 +1870,13 @@
       </p:sp>
       <p:sp>
         <p:nvSpPr>
-          <p:cNvPr id="21" name="Text 19"/>
-          <p:cNvSpPr/>
-          <p:nvPr/>
-        </p:nvSpPr>
-        <p:spPr>
-          <a:xfrm>
-            <a:off x="4846320" y="1463040"/>
+          <p:cNvPr id="27" name="Text 25"/>
+          <p:cNvSpPr/>
+          <p:nvPr/>
+        </p:nvSpPr>
+        <p:spPr>
+          <a:xfrm>
+            <a:off x="4846320" y="2377440"/>
             <a:ext cx="274320" cy="274320"/>
           </a:xfrm>
           <a:prstGeom prst="rect">
@@ -1714,14 +1908,14 @@
       </p:sp>
       <p:sp>
         <p:nvSpPr>
-          <p:cNvPr id="22" name="Text 20"/>
-          <p:cNvSpPr/>
-          <p:nvPr/>
-        </p:nvSpPr>
-        <p:spPr>
-          <a:xfrm>
-            <a:off x="5212080" y="1508760"/>
-            <a:ext cx="3200400" cy="731520"/>
+          <p:cNvPr id="28" name="Text 26"/>
+          <p:cNvSpPr/>
+          <p:nvPr/>
+        </p:nvSpPr>
+        <p:spPr>
+          <a:xfrm>
+            <a:off x="5212080" y="2468880"/>
+            <a:ext cx="3200400" cy="365760"/>
           </a:xfrm>
           <a:prstGeom prst="rect">
             <a:avLst/>
@@ -1733,184 +1927,20 @@
           <a:bodyPr wrap="square" rtlCol="0" anchor="ctr"/>
           <a:lstStyle/>
           <a:p>
-            <a:pPr indent="0" marL="0">
+            <a:pPr algn="l" indent="0" marL="0">
               <a:buNone/>
             </a:pPr>
             <a:r>
-              <a:rPr lang="en-US" sz="1100" dirty="0">
+              <a:rPr lang="en-US" sz="1300" dirty="0">
                 <a:solidFill>
                   <a:srgbClr val="E0E0E0"/>
                 </a:solidFill>
               </a:rPr>
-              <a:t>Box=Rectangular Prism, Pot=Cylinder,</a:t>
-            </a:r>
-            <a:endParaRPr lang="en-US" sz="1100" dirty="0"/>
-          </a:p>
-          <a:p>
-            <a:pPr indent="0" marL="0">
-              <a:buNone/>
-            </a:pPr>
-            <a:r>
-              <a:rPr lang="en-US" sz="1100" dirty="0">
-                <a:solidFill>
-                  <a:srgbClr val="E0E0E0"/>
-                </a:solidFill>
-              </a:rPr>
-              <a:t>Shaker=Cone, Cabbage=Sphere, Hat=Cone</a:t>
-            </a:r>
-            <a:endParaRPr lang="en-US" sz="1100" dirty="0"/>
-          </a:p>
-        </p:txBody>
-      </p:sp>
-      <p:sp>
-        <p:nvSpPr>
-          <p:cNvPr id="23" name="Shape 21"/>
-          <p:cNvSpPr/>
-          <p:nvPr/>
-        </p:nvSpPr>
-        <p:spPr>
-          <a:xfrm>
-            <a:off x="5303520" y="2020824"/>
-            <a:ext cx="365760" cy="274320"/>
-          </a:xfrm>
-          <a:prstGeom prst="rect">
-            <a:avLst/>
-          </a:prstGeom>
-          <a:solidFill>
-            <a:srgbClr val="66B3FF"/>
-          </a:solidFill>
-          <a:ln w="12700">
-            <a:solidFill>
-              <a:srgbClr val="000000"/>
-            </a:solidFill>
-            <a:prstDash val="solid"/>
-          </a:ln>
-        </p:spPr>
-      </p:sp>
-      <p:sp>
-        <p:nvSpPr>
-          <p:cNvPr id="24" name="Shape 22"/>
-          <p:cNvSpPr/>
-          <p:nvPr/>
-        </p:nvSpPr>
-        <p:spPr>
-          <a:xfrm>
-            <a:off x="5449824" y="1874520"/>
-            <a:ext cx="365760" cy="146304"/>
-          </a:xfrm>
-          <a:prstGeom prst="rect">
-            <a:avLst/>
-          </a:prstGeom>
-          <a:solidFill>
-            <a:srgbClr val="99E6FF"/>
-          </a:solidFill>
-          <a:ln w="12700">
-            <a:solidFill>
-              <a:srgbClr val="000000"/>
-            </a:solidFill>
-            <a:prstDash val="solid"/>
-          </a:ln>
-        </p:spPr>
-      </p:sp>
-      <p:sp>
-        <p:nvSpPr>
-          <p:cNvPr id="25" name="Shape 23"/>
-          <p:cNvSpPr/>
-          <p:nvPr/>
-        </p:nvSpPr>
-        <p:spPr>
-          <a:xfrm>
-            <a:off x="5669280" y="2020824"/>
-            <a:ext cx="146304" cy="274320"/>
-          </a:xfrm>
-          <a:prstGeom prst="rect">
-            <a:avLst/>
-          </a:prstGeom>
-          <a:solidFill>
-            <a:srgbClr val="3380CC"/>
-          </a:solidFill>
-          <a:ln w="12700">
-            <a:solidFill>
-              <a:srgbClr val="000000"/>
-            </a:solidFill>
-            <a:prstDash val="solid"/>
-          </a:ln>
-        </p:spPr>
-      </p:sp>
-      <p:sp>
-        <p:nvSpPr>
-          <p:cNvPr id="26" name="Shape 24"/>
-          <p:cNvSpPr/>
-          <p:nvPr/>
-        </p:nvSpPr>
-        <p:spPr>
-          <a:xfrm>
-            <a:off x="5852160" y="1828800"/>
-            <a:ext cx="274320" cy="82296"/>
-          </a:xfrm>
-          <a:prstGeom prst="ellipse">
-            <a:avLst/>
-          </a:prstGeom>
-          <a:solidFill>
-            <a:srgbClr val="99E6FF"/>
-          </a:solidFill>
-          <a:ln w="12700">
-            <a:solidFill>
-              <a:srgbClr val="000000"/>
-            </a:solidFill>
-            <a:prstDash val="solid"/>
-          </a:ln>
-        </p:spPr>
-      </p:sp>
-      <p:sp>
-        <p:nvSpPr>
-          <p:cNvPr id="27" name="Shape 25"/>
-          <p:cNvSpPr/>
-          <p:nvPr/>
-        </p:nvSpPr>
-        <p:spPr>
-          <a:xfrm>
-            <a:off x="5852160" y="1869948"/>
-            <a:ext cx="274320" cy="320040"/>
-          </a:xfrm>
-          <a:prstGeom prst="rect">
-            <a:avLst/>
-          </a:prstGeom>
-          <a:solidFill>
-            <a:srgbClr val="66B3FF"/>
-          </a:solidFill>
-          <a:ln w="12700">
-            <a:solidFill>
-              <a:srgbClr val="000000"/>
-            </a:solidFill>
-            <a:prstDash val="solid"/>
-          </a:ln>
-        </p:spPr>
-      </p:sp>
-      <p:sp>
-        <p:nvSpPr>
-          <p:cNvPr id="28" name="Shape 26"/>
-          <p:cNvSpPr/>
-          <p:nvPr/>
-        </p:nvSpPr>
-        <p:spPr>
-          <a:xfrm>
-            <a:off x="5852160" y="2148840"/>
-            <a:ext cx="274320" cy="82296"/>
-          </a:xfrm>
-          <a:prstGeom prst="ellipse">
-            <a:avLst/>
-          </a:prstGeom>
-          <a:solidFill>
-            <a:srgbClr val="4C99E5"/>
-          </a:solidFill>
-          <a:ln w="12700">
-            <a:solidFill>
-              <a:srgbClr val="000000"/>
-            </a:solidFill>
-            <a:prstDash val="solid"/>
-          </a:ln>
-        </p:spPr>
+              <a:t>Rectangular Prism, Cylinder, Cone, Sphere, Cone</a:t>
+            </a:r>
+            <a:endParaRPr lang="en-US" sz="1300" dirty="0"/>
+          </a:p>
+        </p:txBody>
       </p:sp>
       <p:sp>
         <p:nvSpPr>
@@ -1920,156 +1950,8 @@
         </p:nvSpPr>
         <p:spPr>
           <a:xfrm>
-            <a:off x="5852160" y="1869948"/>
-            <a:ext cx="0" cy="320040"/>
-          </a:xfrm>
-          <a:prstGeom prst="line">
-            <a:avLst/>
-          </a:prstGeom>
-          <a:noFill/>
-          <a:ln w="12700">
-            <a:solidFill>
-              <a:srgbClr val="000000"/>
-            </a:solidFill>
-            <a:prstDash val="solid"/>
-          </a:ln>
-        </p:spPr>
-      </p:sp>
-      <p:sp>
-        <p:nvSpPr>
-          <p:cNvPr id="30" name="Shape 28"/>
-          <p:cNvSpPr/>
-          <p:nvPr/>
-        </p:nvSpPr>
-        <p:spPr>
-          <a:xfrm>
-            <a:off x="6126480" y="1869948"/>
-            <a:ext cx="0" cy="320040"/>
-          </a:xfrm>
-          <a:prstGeom prst="line">
-            <a:avLst/>
-          </a:prstGeom>
-          <a:noFill/>
-          <a:ln w="12700">
-            <a:solidFill>
-              <a:srgbClr val="000000"/>
-            </a:solidFill>
-            <a:prstDash val="solid"/>
-          </a:ln>
-        </p:spPr>
-      </p:sp>
-      <p:sp>
-        <p:nvSpPr>
-          <p:cNvPr id="31" name="Shape 29"/>
-          <p:cNvSpPr/>
-          <p:nvPr/>
-        </p:nvSpPr>
-        <p:spPr>
-          <a:xfrm>
-            <a:off x="6309360" y="2148840"/>
-            <a:ext cx="274320" cy="82296"/>
-          </a:xfrm>
-          <a:prstGeom prst="ellipse">
-            <a:avLst/>
-          </a:prstGeom>
-          <a:solidFill>
-            <a:srgbClr val="4C99E5"/>
-          </a:solidFill>
-          <a:ln w="12700">
-            <a:solidFill>
-              <a:srgbClr val="000000"/>
-            </a:solidFill>
-            <a:prstDash val="solid"/>
-          </a:ln>
-        </p:spPr>
-      </p:sp>
-      <p:sp>
-        <p:nvSpPr>
-          <p:cNvPr id="32" name="Shape 30"/>
-          <p:cNvSpPr/>
-          <p:nvPr/>
-        </p:nvSpPr>
-        <p:spPr>
-          <a:xfrm flipV="1">
-            <a:off x="6309360" y="1828800"/>
-            <a:ext cx="274320" cy="320040"/>
-          </a:xfrm>
-          <a:prstGeom prst="triangle">
-            <a:avLst/>
-          </a:prstGeom>
-          <a:solidFill>
-            <a:srgbClr val="66B3FF"/>
-          </a:solidFill>
-          <a:ln w="12700">
-            <a:solidFill>
-              <a:srgbClr val="000000"/>
-            </a:solidFill>
-            <a:prstDash val="solid"/>
-          </a:ln>
-        </p:spPr>
-      </p:sp>
-      <p:sp>
-        <p:nvSpPr>
-          <p:cNvPr id="33" name="Shape 31"/>
-          <p:cNvSpPr/>
-          <p:nvPr/>
-        </p:nvSpPr>
-        <p:spPr>
-          <a:xfrm>
-            <a:off x="6766560" y="1874520"/>
-            <a:ext cx="274320" cy="274320"/>
-          </a:xfrm>
-          <a:prstGeom prst="ellipse">
-            <a:avLst/>
-          </a:prstGeom>
-          <a:solidFill>
-            <a:srgbClr val="66B3FF"/>
-          </a:solidFill>
-          <a:ln w="12700">
-            <a:solidFill>
-              <a:srgbClr val="000000"/>
-            </a:solidFill>
-            <a:prstDash val="solid"/>
-          </a:ln>
-        </p:spPr>
-      </p:sp>
-      <p:sp>
-        <p:nvSpPr>
-          <p:cNvPr id="34" name="Shape 32"/>
-          <p:cNvSpPr/>
-          <p:nvPr/>
-        </p:nvSpPr>
-        <p:spPr>
-          <a:xfrm>
-            <a:off x="6807708" y="1915668"/>
-            <a:ext cx="82296" cy="82296"/>
-          </a:xfrm>
-          <a:prstGeom prst="ellipse">
-            <a:avLst/>
-          </a:prstGeom>
-          <a:solidFill>
-            <a:srgbClr val="B3FFFF">
-              <a:alpha val="50000"/>
-            </a:srgbClr>
-          </a:solidFill>
-          <a:ln w="12700">
-            <a:solidFill>
-              <a:srgbClr val="333333"/>
-            </a:solidFill>
-            <a:prstDash val="solid"/>
-          </a:ln>
-        </p:spPr>
-      </p:sp>
-      <p:sp>
-        <p:nvSpPr>
-          <p:cNvPr id="35" name="Shape 33"/>
-          <p:cNvSpPr/>
-          <p:nvPr/>
-        </p:nvSpPr>
-        <p:spPr>
-          <a:xfrm>
-            <a:off x="457200" y="2560320"/>
-            <a:ext cx="3840480" cy="1005840"/>
+            <a:off x="457200" y="3154680"/>
+            <a:ext cx="3840480" cy="685800"/>
           </a:xfrm>
           <a:prstGeom prst="rect">
             <a:avLst/>
@@ -2087,13 +1969,13 @@
       </p:sp>
       <p:sp>
         <p:nvSpPr>
-          <p:cNvPr id="36" name="Text 34"/>
-          <p:cNvSpPr/>
-          <p:nvPr/>
-        </p:nvSpPr>
-        <p:spPr>
-          <a:xfrm>
-            <a:off x="548640" y="2651760"/>
+          <p:cNvPr id="30" name="Text 28"/>
+          <p:cNvSpPr/>
+          <p:nvPr/>
+        </p:nvSpPr>
+        <p:spPr>
+          <a:xfrm>
+            <a:off x="548640" y="3246120"/>
             <a:ext cx="274320" cy="274320"/>
           </a:xfrm>
           <a:prstGeom prst="rect">
@@ -2125,14 +2007,14 @@
       </p:sp>
       <p:sp>
         <p:nvSpPr>
-          <p:cNvPr id="37" name="Text 35"/>
-          <p:cNvSpPr/>
-          <p:nvPr/>
-        </p:nvSpPr>
-        <p:spPr>
-          <a:xfrm>
-            <a:off x="914400" y="2697480"/>
-            <a:ext cx="3200400" cy="731520"/>
+          <p:cNvPr id="31" name="Text 29"/>
+          <p:cNvSpPr/>
+          <p:nvPr/>
+        </p:nvSpPr>
+        <p:spPr>
+          <a:xfrm>
+            <a:off x="914400" y="3337560"/>
+            <a:ext cx="3200400" cy="365760"/>
           </a:xfrm>
           <a:prstGeom prst="rect">
             <a:avLst/>
@@ -2144,368 +2026,31 @@
           <a:bodyPr wrap="square" rtlCol="0" anchor="ctr"/>
           <a:lstStyle/>
           <a:p>
-            <a:pPr indent="0" marL="0">
+            <a:pPr algn="l" indent="0" marL="0">
               <a:buNone/>
             </a:pPr>
             <a:r>
-              <a:rPr lang="en-US" sz="1100" dirty="0">
+              <a:rPr lang="en-US" sz="1300" dirty="0">
                 <a:solidFill>
                   <a:srgbClr val="E0E0E0"/>
                 </a:solidFill>
               </a:rPr>
-              <a:t>Box=Rectangular Prism, Pot=Sphere,</a:t>
-            </a:r>
-            <a:endParaRPr lang="en-US" sz="1100" dirty="0"/>
-          </a:p>
-          <a:p>
-            <a:pPr indent="0" marL="0">
-              <a:buNone/>
-            </a:pPr>
-            <a:r>
-              <a:rPr lang="en-US" sz="1100" dirty="0">
-                <a:solidFill>
-                  <a:srgbClr val="E0E0E0"/>
-                </a:solidFill>
-              </a:rPr>
-              <a:t>Shaker=Cylinder, Cabbage=Cube, Hat=Cone</a:t>
-            </a:r>
-            <a:endParaRPr lang="en-US" sz="1100" dirty="0"/>
-          </a:p>
-        </p:txBody>
-      </p:sp>
-      <p:sp>
-        <p:nvSpPr>
-          <p:cNvPr id="38" name="Shape 36"/>
-          <p:cNvSpPr/>
-          <p:nvPr/>
-        </p:nvSpPr>
-        <p:spPr>
-          <a:xfrm>
-            <a:off x="914400" y="3209544"/>
-            <a:ext cx="365760" cy="274320"/>
-          </a:xfrm>
-          <a:prstGeom prst="rect">
-            <a:avLst/>
-          </a:prstGeom>
-          <a:solidFill>
-            <a:srgbClr val="FF9999"/>
-          </a:solidFill>
-          <a:ln w="12700">
-            <a:solidFill>
-              <a:srgbClr val="000000"/>
-            </a:solidFill>
-            <a:prstDash val="solid"/>
-          </a:ln>
-        </p:spPr>
-      </p:sp>
-      <p:sp>
-        <p:nvSpPr>
-          <p:cNvPr id="39" name="Shape 37"/>
-          <p:cNvSpPr/>
-          <p:nvPr/>
-        </p:nvSpPr>
-        <p:spPr>
-          <a:xfrm>
-            <a:off x="1060704" y="3063240"/>
-            <a:ext cx="365760" cy="146304"/>
-          </a:xfrm>
-          <a:prstGeom prst="rect">
-            <a:avLst/>
-          </a:prstGeom>
-          <a:solidFill>
-            <a:srgbClr val="FFCCCC"/>
-          </a:solidFill>
-          <a:ln w="12700">
-            <a:solidFill>
-              <a:srgbClr val="000000"/>
-            </a:solidFill>
-            <a:prstDash val="solid"/>
-          </a:ln>
-        </p:spPr>
-      </p:sp>
-      <p:sp>
-        <p:nvSpPr>
-          <p:cNvPr id="40" name="Shape 38"/>
-          <p:cNvSpPr/>
-          <p:nvPr/>
-        </p:nvSpPr>
-        <p:spPr>
-          <a:xfrm>
-            <a:off x="1280160" y="3209544"/>
-            <a:ext cx="146304" cy="274320"/>
-          </a:xfrm>
-          <a:prstGeom prst="rect">
-            <a:avLst/>
-          </a:prstGeom>
-          <a:solidFill>
-            <a:srgbClr val="CC6666"/>
-          </a:solidFill>
-          <a:ln w="12700">
-            <a:solidFill>
-              <a:srgbClr val="000000"/>
-            </a:solidFill>
-            <a:prstDash val="solid"/>
-          </a:ln>
-        </p:spPr>
-      </p:sp>
-      <p:sp>
-        <p:nvSpPr>
-          <p:cNvPr id="41" name="Shape 39"/>
-          <p:cNvSpPr/>
-          <p:nvPr/>
-        </p:nvSpPr>
-        <p:spPr>
-          <a:xfrm>
-            <a:off x="1463040" y="3063240"/>
-            <a:ext cx="274320" cy="274320"/>
-          </a:xfrm>
-          <a:prstGeom prst="ellipse">
-            <a:avLst/>
-          </a:prstGeom>
-          <a:solidFill>
-            <a:srgbClr val="FF9999"/>
-          </a:solidFill>
-          <a:ln w="12700">
-            <a:solidFill>
-              <a:srgbClr val="000000"/>
-            </a:solidFill>
-            <a:prstDash val="solid"/>
-          </a:ln>
-        </p:spPr>
-      </p:sp>
-      <p:sp>
-        <p:nvSpPr>
-          <p:cNvPr id="42" name="Shape 40"/>
-          <p:cNvSpPr/>
-          <p:nvPr/>
-        </p:nvSpPr>
-        <p:spPr>
-          <a:xfrm>
-            <a:off x="1504188" y="3104388"/>
-            <a:ext cx="82296" cy="82296"/>
-          </a:xfrm>
-          <a:prstGeom prst="ellipse">
-            <a:avLst/>
-          </a:prstGeom>
-          <a:solidFill>
-            <a:srgbClr val="FFE6E6">
-              <a:alpha val="50000"/>
-            </a:srgbClr>
-          </a:solidFill>
-          <a:ln w="12700">
-            <a:solidFill>
-              <a:srgbClr val="333333"/>
-            </a:solidFill>
-            <a:prstDash val="solid"/>
-          </a:ln>
-        </p:spPr>
-      </p:sp>
-      <p:sp>
-        <p:nvSpPr>
-          <p:cNvPr id="43" name="Shape 41"/>
-          <p:cNvSpPr/>
-          <p:nvPr/>
-        </p:nvSpPr>
-        <p:spPr>
-          <a:xfrm>
-            <a:off x="1920240" y="3017520"/>
-            <a:ext cx="274320" cy="82296"/>
-          </a:xfrm>
-          <a:prstGeom prst="ellipse">
-            <a:avLst/>
-          </a:prstGeom>
-          <a:solidFill>
-            <a:srgbClr val="FFCCCC"/>
-          </a:solidFill>
-          <a:ln w="12700">
-            <a:solidFill>
-              <a:srgbClr val="000000"/>
-            </a:solidFill>
-            <a:prstDash val="solid"/>
-          </a:ln>
-        </p:spPr>
-      </p:sp>
-      <p:sp>
-        <p:nvSpPr>
-          <p:cNvPr id="44" name="Shape 42"/>
-          <p:cNvSpPr/>
-          <p:nvPr/>
-        </p:nvSpPr>
-        <p:spPr>
-          <a:xfrm>
-            <a:off x="1920240" y="3058668"/>
-            <a:ext cx="274320" cy="320040"/>
-          </a:xfrm>
-          <a:prstGeom prst="rect">
-            <a:avLst/>
-          </a:prstGeom>
-          <a:solidFill>
-            <a:srgbClr val="FF9999"/>
-          </a:solidFill>
-          <a:ln w="12700">
-            <a:solidFill>
-              <a:srgbClr val="000000"/>
-            </a:solidFill>
-            <a:prstDash val="solid"/>
-          </a:ln>
-        </p:spPr>
-      </p:sp>
-      <p:sp>
-        <p:nvSpPr>
-          <p:cNvPr id="45" name="Shape 43"/>
-          <p:cNvSpPr/>
-          <p:nvPr/>
-        </p:nvSpPr>
-        <p:spPr>
-          <a:xfrm>
-            <a:off x="1920240" y="3337560"/>
-            <a:ext cx="274320" cy="82296"/>
-          </a:xfrm>
-          <a:prstGeom prst="ellipse">
-            <a:avLst/>
-          </a:prstGeom>
-          <a:solidFill>
-            <a:srgbClr val="E57F7F"/>
-          </a:solidFill>
-          <a:ln w="12700">
-            <a:solidFill>
-              <a:srgbClr val="000000"/>
-            </a:solidFill>
-            <a:prstDash val="solid"/>
-          </a:ln>
-        </p:spPr>
-      </p:sp>
-      <p:sp>
-        <p:nvSpPr>
-          <p:cNvPr id="46" name="Shape 44"/>
-          <p:cNvSpPr/>
-          <p:nvPr/>
-        </p:nvSpPr>
-        <p:spPr>
-          <a:xfrm>
-            <a:off x="1920240" y="3058668"/>
-            <a:ext cx="0" cy="320040"/>
-          </a:xfrm>
-          <a:prstGeom prst="line">
-            <a:avLst/>
-          </a:prstGeom>
-          <a:noFill/>
-          <a:ln w="12700">
-            <a:solidFill>
-              <a:srgbClr val="000000"/>
-            </a:solidFill>
-            <a:prstDash val="solid"/>
-          </a:ln>
-        </p:spPr>
-      </p:sp>
-      <p:sp>
-        <p:nvSpPr>
-          <p:cNvPr id="47" name="Shape 45"/>
-          <p:cNvSpPr/>
-          <p:nvPr/>
-        </p:nvSpPr>
-        <p:spPr>
-          <a:xfrm>
-            <a:off x="2194560" y="3058668"/>
-            <a:ext cx="0" cy="320040"/>
-          </a:xfrm>
-          <a:prstGeom prst="line">
-            <a:avLst/>
-          </a:prstGeom>
-          <a:noFill/>
-          <a:ln w="12700">
-            <a:solidFill>
-              <a:srgbClr val="000000"/>
-            </a:solidFill>
-            <a:prstDash val="solid"/>
-          </a:ln>
-        </p:spPr>
-      </p:sp>
-      <p:sp>
-        <p:nvSpPr>
-          <p:cNvPr id="48" name="Shape 46"/>
-          <p:cNvSpPr/>
-          <p:nvPr/>
-        </p:nvSpPr>
-        <p:spPr>
-          <a:xfrm>
-            <a:off x="2377440" y="3127248"/>
-            <a:ext cx="274320" cy="274320"/>
-          </a:xfrm>
-          <a:prstGeom prst="rect">
-            <a:avLst/>
-          </a:prstGeom>
-          <a:solidFill>
-            <a:srgbClr val="FF9999"/>
-          </a:solidFill>
-          <a:ln w="12700">
-            <a:solidFill>
-              <a:srgbClr val="000000"/>
-            </a:solidFill>
-            <a:prstDash val="solid"/>
-          </a:ln>
-        </p:spPr>
-      </p:sp>
-      <p:sp>
-        <p:nvSpPr>
-          <p:cNvPr id="49" name="Shape 47"/>
-          <p:cNvSpPr/>
-          <p:nvPr/>
-        </p:nvSpPr>
-        <p:spPr>
-          <a:xfrm>
-            <a:off x="2487168" y="3017520"/>
-            <a:ext cx="274320" cy="109728"/>
-          </a:xfrm>
-          <a:prstGeom prst="rect">
-            <a:avLst/>
-          </a:prstGeom>
-          <a:solidFill>
-            <a:srgbClr val="FFCCCC"/>
-          </a:solidFill>
-          <a:ln w="12700">
-            <a:solidFill>
-              <a:srgbClr val="000000"/>
-            </a:solidFill>
-            <a:prstDash val="solid"/>
-          </a:ln>
-        </p:spPr>
-      </p:sp>
-      <p:sp>
-        <p:nvSpPr>
-          <p:cNvPr id="50" name="Shape 48"/>
-          <p:cNvSpPr/>
-          <p:nvPr/>
-        </p:nvSpPr>
-        <p:spPr>
-          <a:xfrm>
-            <a:off x="2651760" y="3127248"/>
-            <a:ext cx="109728" cy="274320"/>
-          </a:xfrm>
-          <a:prstGeom prst="rect">
-            <a:avLst/>
-          </a:prstGeom>
-          <a:solidFill>
-            <a:srgbClr val="CC6666"/>
-          </a:solidFill>
-          <a:ln w="12700">
-            <a:solidFill>
-              <a:srgbClr val="000000"/>
-            </a:solidFill>
-            <a:prstDash val="solid"/>
-          </a:ln>
-        </p:spPr>
-      </p:sp>
-      <p:sp>
-        <p:nvSpPr>
-          <p:cNvPr id="51" name="Shape 49"/>
-          <p:cNvSpPr/>
-          <p:nvPr/>
-        </p:nvSpPr>
-        <p:spPr>
-          <a:xfrm>
-            <a:off x="4754880" y="2560320"/>
-            <a:ext cx="3840480" cy="1005840"/>
+              <a:t>Rectangular Prism, Sphere, Cylinder, Cube, Cone</a:t>
+            </a:r>
+            <a:endParaRPr lang="en-US" sz="1300" dirty="0"/>
+          </a:p>
+        </p:txBody>
+      </p:sp>
+      <p:sp>
+        <p:nvSpPr>
+          <p:cNvPr id="32" name="Shape 30"/>
+          <p:cNvSpPr/>
+          <p:nvPr/>
+        </p:nvSpPr>
+        <p:spPr>
+          <a:xfrm>
+            <a:off x="4754880" y="3154680"/>
+            <a:ext cx="3840480" cy="685800"/>
           </a:xfrm>
           <a:prstGeom prst="rect">
             <a:avLst/>
@@ -2523,13 +2068,13 @@
       </p:sp>
       <p:sp>
         <p:nvSpPr>
-          <p:cNvPr id="52" name="Text 50"/>
-          <p:cNvSpPr/>
-          <p:nvPr/>
-        </p:nvSpPr>
-        <p:spPr>
-          <a:xfrm>
-            <a:off x="4846320" y="2651760"/>
+          <p:cNvPr id="33" name="Text 31"/>
+          <p:cNvSpPr/>
+          <p:nvPr/>
+        </p:nvSpPr>
+        <p:spPr>
+          <a:xfrm>
+            <a:off x="4846320" y="3246120"/>
             <a:ext cx="274320" cy="274320"/>
           </a:xfrm>
           <a:prstGeom prst="rect">
@@ -2561,14 +2106,14 @@
       </p:sp>
       <p:sp>
         <p:nvSpPr>
-          <p:cNvPr id="53" name="Text 51"/>
-          <p:cNvSpPr/>
-          <p:nvPr/>
-        </p:nvSpPr>
-        <p:spPr>
-          <a:xfrm>
-            <a:off x="5212080" y="2697480"/>
-            <a:ext cx="3200400" cy="731520"/>
+          <p:cNvPr id="34" name="Text 32"/>
+          <p:cNvSpPr/>
+          <p:nvPr/>
+        </p:nvSpPr>
+        <p:spPr>
+          <a:xfrm>
+            <a:off x="5212080" y="3337560"/>
+            <a:ext cx="3200400" cy="365760"/>
           </a:xfrm>
           <a:prstGeom prst="rect">
             <a:avLst/>
@@ -2580,311 +2125,24 @@
           <a:bodyPr wrap="square" rtlCol="0" anchor="ctr"/>
           <a:lstStyle/>
           <a:p>
-            <a:pPr indent="0" marL="0">
+            <a:pPr algn="l" indent="0" marL="0">
               <a:buNone/>
             </a:pPr>
             <a:r>
-              <a:rPr lang="en-US" sz="1100" dirty="0">
+              <a:rPr lang="en-US" sz="1300" dirty="0">
                 <a:solidFill>
                   <a:srgbClr val="E0E0E0"/>
                 </a:solidFill>
               </a:rPr>
-              <a:t>Box=Cube, Pot=Cylinder, Shaker=Cube,</a:t>
-            </a:r>
-            <a:endParaRPr lang="en-US" sz="1100" dirty="0"/>
-          </a:p>
-          <a:p>
-            <a:pPr indent="0" marL="0">
-              <a:buNone/>
-            </a:pPr>
-            <a:r>
-              <a:rPr lang="en-US" sz="1100" dirty="0">
-                <a:solidFill>
-                  <a:srgbClr val="E0E0E0"/>
-                </a:solidFill>
-              </a:rPr>
-              <a:t>Cabbage=Ball, Hat=Triangle</a:t>
-            </a:r>
-            <a:endParaRPr lang="en-US" sz="1100" dirty="0"/>
-          </a:p>
-        </p:txBody>
-      </p:sp>
-      <p:sp>
-        <p:nvSpPr>
-          <p:cNvPr id="54" name="Shape 52"/>
-          <p:cNvSpPr/>
-          <p:nvPr/>
-        </p:nvSpPr>
-        <p:spPr>
-          <a:xfrm>
-            <a:off x="5303520" y="3127248"/>
-            <a:ext cx="274320" cy="274320"/>
-          </a:xfrm>
-          <a:prstGeom prst="rect">
-            <a:avLst/>
-          </a:prstGeom>
-          <a:solidFill>
-            <a:srgbClr val="FF9999"/>
-          </a:solidFill>
-          <a:ln w="12700">
-            <a:solidFill>
-              <a:srgbClr val="000000"/>
-            </a:solidFill>
-            <a:prstDash val="solid"/>
-          </a:ln>
-        </p:spPr>
-      </p:sp>
-      <p:sp>
-        <p:nvSpPr>
-          <p:cNvPr id="55" name="Shape 53"/>
-          <p:cNvSpPr/>
-          <p:nvPr/>
-        </p:nvSpPr>
-        <p:spPr>
-          <a:xfrm>
-            <a:off x="5413248" y="3017520"/>
-            <a:ext cx="274320" cy="109728"/>
-          </a:xfrm>
-          <a:prstGeom prst="rect">
-            <a:avLst/>
-          </a:prstGeom>
-          <a:solidFill>
-            <a:srgbClr val="FFCCCC"/>
-          </a:solidFill>
-          <a:ln w="12700">
-            <a:solidFill>
-              <a:srgbClr val="000000"/>
-            </a:solidFill>
-            <a:prstDash val="solid"/>
-          </a:ln>
-        </p:spPr>
-      </p:sp>
-      <p:sp>
-        <p:nvSpPr>
-          <p:cNvPr id="56" name="Shape 54"/>
-          <p:cNvSpPr/>
-          <p:nvPr/>
-        </p:nvSpPr>
-        <p:spPr>
-          <a:xfrm>
-            <a:off x="5577840" y="3127248"/>
-            <a:ext cx="109728" cy="274320"/>
-          </a:xfrm>
-          <a:prstGeom prst="rect">
-            <a:avLst/>
-          </a:prstGeom>
-          <a:solidFill>
-            <a:srgbClr val="CC6666"/>
-          </a:solidFill>
-          <a:ln w="12700">
-            <a:solidFill>
-              <a:srgbClr val="000000"/>
-            </a:solidFill>
-            <a:prstDash val="solid"/>
-          </a:ln>
-        </p:spPr>
-      </p:sp>
-      <p:sp>
-        <p:nvSpPr>
-          <p:cNvPr id="57" name="Shape 55"/>
-          <p:cNvSpPr/>
-          <p:nvPr/>
-        </p:nvSpPr>
-        <p:spPr>
-          <a:xfrm>
-            <a:off x="5760720" y="2971800"/>
-            <a:ext cx="274320" cy="82296"/>
-          </a:xfrm>
-          <a:prstGeom prst="ellipse">
-            <a:avLst/>
-          </a:prstGeom>
-          <a:solidFill>
-            <a:srgbClr val="FFCCCC"/>
-          </a:solidFill>
-          <a:ln w="12700">
-            <a:solidFill>
-              <a:srgbClr val="000000"/>
-            </a:solidFill>
-            <a:prstDash val="solid"/>
-          </a:ln>
-        </p:spPr>
-      </p:sp>
-      <p:sp>
-        <p:nvSpPr>
-          <p:cNvPr id="58" name="Shape 56"/>
-          <p:cNvSpPr/>
-          <p:nvPr/>
-        </p:nvSpPr>
-        <p:spPr>
-          <a:xfrm>
-            <a:off x="5760720" y="3012948"/>
-            <a:ext cx="274320" cy="320040"/>
-          </a:xfrm>
-          <a:prstGeom prst="rect">
-            <a:avLst/>
-          </a:prstGeom>
-          <a:solidFill>
-            <a:srgbClr val="FF9999"/>
-          </a:solidFill>
-          <a:ln w="12700">
-            <a:solidFill>
-              <a:srgbClr val="000000"/>
-            </a:solidFill>
-            <a:prstDash val="solid"/>
-          </a:ln>
-        </p:spPr>
-      </p:sp>
-      <p:sp>
-        <p:nvSpPr>
-          <p:cNvPr id="59" name="Shape 57"/>
-          <p:cNvSpPr/>
-          <p:nvPr/>
-        </p:nvSpPr>
-        <p:spPr>
-          <a:xfrm>
-            <a:off x="5760720" y="3291840"/>
-            <a:ext cx="274320" cy="82296"/>
-          </a:xfrm>
-          <a:prstGeom prst="ellipse">
-            <a:avLst/>
-          </a:prstGeom>
-          <a:solidFill>
-            <a:srgbClr val="E57F7F"/>
-          </a:solidFill>
-          <a:ln w="12700">
-            <a:solidFill>
-              <a:srgbClr val="000000"/>
-            </a:solidFill>
-            <a:prstDash val="solid"/>
-          </a:ln>
-        </p:spPr>
-      </p:sp>
-      <p:sp>
-        <p:nvSpPr>
-          <p:cNvPr id="60" name="Shape 58"/>
-          <p:cNvSpPr/>
-          <p:nvPr/>
-        </p:nvSpPr>
-        <p:spPr>
-          <a:xfrm>
-            <a:off x="5760720" y="3012948"/>
-            <a:ext cx="0" cy="320040"/>
-          </a:xfrm>
-          <a:prstGeom prst="line">
-            <a:avLst/>
-          </a:prstGeom>
-          <a:noFill/>
-          <a:ln w="12700">
-            <a:solidFill>
-              <a:srgbClr val="000000"/>
-            </a:solidFill>
-            <a:prstDash val="solid"/>
-          </a:ln>
-        </p:spPr>
-      </p:sp>
-      <p:sp>
-        <p:nvSpPr>
-          <p:cNvPr id="61" name="Shape 59"/>
-          <p:cNvSpPr/>
-          <p:nvPr/>
-        </p:nvSpPr>
-        <p:spPr>
-          <a:xfrm>
-            <a:off x="6035040" y="3012948"/>
-            <a:ext cx="0" cy="320040"/>
-          </a:xfrm>
-          <a:prstGeom prst="line">
-            <a:avLst/>
-          </a:prstGeom>
-          <a:noFill/>
-          <a:ln w="12700">
-            <a:solidFill>
-              <a:srgbClr val="000000"/>
-            </a:solidFill>
-            <a:prstDash val="solid"/>
-          </a:ln>
-        </p:spPr>
-      </p:sp>
-      <p:sp>
-        <p:nvSpPr>
-          <p:cNvPr id="62" name="Shape 60"/>
-          <p:cNvSpPr/>
-          <p:nvPr/>
-        </p:nvSpPr>
-        <p:spPr>
-          <a:xfrm>
-            <a:off x="6217920" y="3017520"/>
-            <a:ext cx="274320" cy="274320"/>
-          </a:xfrm>
-          <a:prstGeom prst="ellipse">
-            <a:avLst/>
-          </a:prstGeom>
-          <a:solidFill>
-            <a:srgbClr val="FF9999"/>
-          </a:solidFill>
-          <a:ln w="12700">
-            <a:solidFill>
-              <a:srgbClr val="000000"/>
-            </a:solidFill>
-            <a:prstDash val="solid"/>
-          </a:ln>
-        </p:spPr>
-      </p:sp>
-      <p:sp>
-        <p:nvSpPr>
-          <p:cNvPr id="63" name="Shape 61"/>
-          <p:cNvSpPr/>
-          <p:nvPr/>
-        </p:nvSpPr>
-        <p:spPr>
-          <a:xfrm>
-            <a:off x="6259068" y="3058668"/>
-            <a:ext cx="82296" cy="82296"/>
-          </a:xfrm>
-          <a:prstGeom prst="ellipse">
-            <a:avLst/>
-          </a:prstGeom>
-          <a:solidFill>
-            <a:srgbClr val="FFE6E6">
-              <a:alpha val="50000"/>
-            </a:srgbClr>
-          </a:solidFill>
-          <a:ln w="12700">
-            <a:solidFill>
-              <a:srgbClr val="333333"/>
-            </a:solidFill>
-            <a:prstDash val="solid"/>
-          </a:ln>
-        </p:spPr>
-      </p:sp>
-      <p:sp>
-        <p:nvSpPr>
-          <p:cNvPr id="64" name="Shape 62"/>
-          <p:cNvSpPr/>
-          <p:nvPr/>
-        </p:nvSpPr>
-        <p:spPr>
-          <a:xfrm>
-            <a:off x="6675120" y="3017520"/>
-            <a:ext cx="274320" cy="274320"/>
-          </a:xfrm>
-          <a:prstGeom prst="triangle">
-            <a:avLst/>
-          </a:prstGeom>
-          <a:solidFill>
-            <a:srgbClr val="FF9999"/>
-          </a:solidFill>
-          <a:ln w="12700">
-            <a:solidFill>
-              <a:srgbClr val="000000"/>
-            </a:solidFill>
-            <a:prstDash val="solid"/>
-          </a:ln>
-        </p:spPr>
-      </p:sp>
-      <p:sp>
-        <p:nvSpPr>
-          <p:cNvPr id="65" name="Shape 63">
+              <a:t>Cube, Cylinder, Cube, Ball, Triangle</a:t>
+            </a:r>
+            <a:endParaRPr lang="en-US" sz="1300" dirty="0"/>
+          </a:p>
+        </p:txBody>
+      </p:sp>
+      <p:sp>
+        <p:nvSpPr>
+          <p:cNvPr id="35" name="Shape 33">
             <a:hlinkClick r:id="rId1" tooltip="" action="ppaction://hlinksldjump"/>
           </p:cNvPr>
           <p:cNvSpPr/>
@@ -2892,8 +2150,8 @@
         </p:nvSpPr>
         <p:spPr>
           <a:xfrm>
-            <a:off x="457200" y="1371600"/>
-            <a:ext cx="3840480" cy="1005840"/>
+            <a:off x="457200" y="2286000"/>
+            <a:ext cx="3840480" cy="685800"/>
           </a:xfrm>
           <a:prstGeom prst="rect">
             <a:avLst/>
@@ -2913,7 +2171,7 @@
       </p:sp>
       <p:sp>
         <p:nvSpPr>
-          <p:cNvPr id="66" name="Shape 64">
+          <p:cNvPr id="36" name="Shape 34">
             <a:hlinkClick r:id="rId2" tooltip="" action="ppaction://hlinksldjump"/>
           </p:cNvPr>
           <p:cNvSpPr/>
@@ -2921,8 +2179,8 @@
         </p:nvSpPr>
         <p:spPr>
           <a:xfrm>
-            <a:off x="4754880" y="1371600"/>
-            <a:ext cx="3840480" cy="1005840"/>
+            <a:off x="4754880" y="2286000"/>
+            <a:ext cx="3840480" cy="685800"/>
           </a:xfrm>
           <a:prstGeom prst="rect">
             <a:avLst/>
@@ -2942,7 +2200,7 @@
       </p:sp>
       <p:sp>
         <p:nvSpPr>
-          <p:cNvPr id="67" name="Shape 65">
+          <p:cNvPr id="37" name="Shape 35">
             <a:hlinkClick r:id="rId3" tooltip="" action="ppaction://hlinksldjump"/>
           </p:cNvPr>
           <p:cNvSpPr/>
@@ -2950,8 +2208,8 @@
         </p:nvSpPr>
         <p:spPr>
           <a:xfrm>
-            <a:off x="457200" y="2560320"/>
-            <a:ext cx="3840480" cy="1005840"/>
+            <a:off x="457200" y="3154680"/>
+            <a:ext cx="3840480" cy="685800"/>
           </a:xfrm>
           <a:prstGeom prst="rect">
             <a:avLst/>
@@ -2971,7 +2229,7 @@
       </p:sp>
       <p:sp>
         <p:nvSpPr>
-          <p:cNvPr id="68" name="Shape 66">
+          <p:cNvPr id="38" name="Shape 36">
             <a:hlinkClick r:id="rId4" tooltip="" action="ppaction://hlinksldjump"/>
           </p:cNvPr>
           <p:cNvSpPr/>
@@ -2979,8 +2237,8 @@
         </p:nvSpPr>
         <p:spPr>
           <a:xfrm>
-            <a:off x="4754880" y="2560320"/>
-            <a:ext cx="3840480" cy="1005840"/>
+            <a:off x="4754880" y="3154680"/>
+            <a:ext cx="3840480" cy="685800"/>
           </a:xfrm>
           <a:prstGeom prst="rect">
             <a:avLst/>
@@ -3106,14 +2364,89 @@
       </p:sp>
       <p:sp>
         <p:nvSpPr>
-          <p:cNvPr id="4" name="Text 2"/>
-          <p:cNvSpPr/>
-          <p:nvPr/>
-        </p:nvSpPr>
-        <p:spPr>
-          <a:xfrm>
-            <a:off x="914400" y="914400"/>
-            <a:ext cx="7315200" cy="274320"/>
+          <p:cNvPr id="4" name="Shape 2"/>
+          <p:cNvSpPr/>
+          <p:nvPr/>
+        </p:nvSpPr>
+        <p:spPr>
+          <a:xfrm>
+            <a:off x="640080" y="1097280"/>
+            <a:ext cx="457200" cy="320040"/>
+          </a:xfrm>
+          <a:prstGeom prst="rect">
+            <a:avLst/>
+          </a:prstGeom>
+          <a:solidFill>
+            <a:srgbClr val="66B3FF"/>
+          </a:solidFill>
+          <a:ln w="12700">
+            <a:solidFill>
+              <a:srgbClr val="000000"/>
+            </a:solidFill>
+            <a:prstDash val="solid"/>
+          </a:ln>
+        </p:spPr>
+      </p:sp>
+      <p:sp>
+        <p:nvSpPr>
+          <p:cNvPr id="5" name="Shape 3"/>
+          <p:cNvSpPr/>
+          <p:nvPr/>
+        </p:nvSpPr>
+        <p:spPr>
+          <a:xfrm>
+            <a:off x="822960" y="914400"/>
+            <a:ext cx="457200" cy="182880"/>
+          </a:xfrm>
+          <a:prstGeom prst="rect">
+            <a:avLst/>
+          </a:prstGeom>
+          <a:solidFill>
+            <a:srgbClr val="99E6FF"/>
+          </a:solidFill>
+          <a:ln w="12700">
+            <a:solidFill>
+              <a:srgbClr val="000000"/>
+            </a:solidFill>
+            <a:prstDash val="solid"/>
+          </a:ln>
+        </p:spPr>
+      </p:sp>
+      <p:sp>
+        <p:nvSpPr>
+          <p:cNvPr id="6" name="Shape 4"/>
+          <p:cNvSpPr/>
+          <p:nvPr/>
+        </p:nvSpPr>
+        <p:spPr>
+          <a:xfrm>
+            <a:off x="1097280" y="1097280"/>
+            <a:ext cx="182880" cy="320040"/>
+          </a:xfrm>
+          <a:prstGeom prst="rect">
+            <a:avLst/>
+          </a:prstGeom>
+          <a:solidFill>
+            <a:srgbClr val="3380CC"/>
+          </a:solidFill>
+          <a:ln w="12700">
+            <a:solidFill>
+              <a:srgbClr val="000000"/>
+            </a:solidFill>
+            <a:prstDash val="solid"/>
+          </a:ln>
+        </p:spPr>
+      </p:sp>
+      <p:sp>
+        <p:nvSpPr>
+          <p:cNvPr id="7" name="Text 5"/>
+          <p:cNvSpPr/>
+          <p:nvPr/>
+        </p:nvSpPr>
+        <p:spPr>
+          <a:xfrm>
+            <a:off x="640080" y="1463040"/>
+            <a:ext cx="640080" cy="182880"/>
           </a:xfrm>
           <a:prstGeom prst="rect">
             <a:avLst/>
@@ -3129,27 +2462,444 @@
               <a:buNone/>
             </a:pPr>
             <a:r>
-              <a:rPr lang="en-US" sz="1200" i="1" dirty="0">
+              <a:rPr lang="en-US" sz="1000" dirty="0">
                 <a:solidFill>
                   <a:srgbClr val="E0E0E0"/>
                 </a:solidFill>
               </a:rPr>
-              <a:t>Box | Pot | Shaker | Cabbage | Hat</a:t>
-            </a:r>
-            <a:endParaRPr lang="en-US" sz="1200" dirty="0"/>
-          </a:p>
-        </p:txBody>
-      </p:sp>
-      <p:sp>
-        <p:nvSpPr>
-          <p:cNvPr id="5" name="Shape 3"/>
-          <p:cNvSpPr/>
-          <p:nvPr/>
-        </p:nvSpPr>
-        <p:spPr>
-          <a:xfrm>
-            <a:off x="457200" y="1371600"/>
-            <a:ext cx="3840480" cy="1005840"/>
+              <a:t>Box</a:t>
+            </a:r>
+            <a:endParaRPr lang="en-US" sz="1000" dirty="0"/>
+          </a:p>
+        </p:txBody>
+      </p:sp>
+      <p:sp>
+        <p:nvSpPr>
+          <p:cNvPr id="8" name="Shape 6"/>
+          <p:cNvSpPr/>
+          <p:nvPr/>
+        </p:nvSpPr>
+        <p:spPr>
+          <a:xfrm>
+            <a:off x="2103120" y="868680"/>
+            <a:ext cx="411480" cy="123444"/>
+          </a:xfrm>
+          <a:prstGeom prst="ellipse">
+            <a:avLst/>
+          </a:prstGeom>
+          <a:solidFill>
+            <a:srgbClr val="99E6FF"/>
+          </a:solidFill>
+          <a:ln w="12700">
+            <a:solidFill>
+              <a:srgbClr val="000000"/>
+            </a:solidFill>
+            <a:prstDash val="solid"/>
+          </a:ln>
+        </p:spPr>
+      </p:sp>
+      <p:sp>
+        <p:nvSpPr>
+          <p:cNvPr id="9" name="Shape 7"/>
+          <p:cNvSpPr/>
+          <p:nvPr/>
+        </p:nvSpPr>
+        <p:spPr>
+          <a:xfrm>
+            <a:off x="2103120" y="930402"/>
+            <a:ext cx="411480" cy="365760"/>
+          </a:xfrm>
+          <a:prstGeom prst="rect">
+            <a:avLst/>
+          </a:prstGeom>
+          <a:solidFill>
+            <a:srgbClr val="66B3FF"/>
+          </a:solidFill>
+          <a:ln w="12700">
+            <a:solidFill>
+              <a:srgbClr val="000000"/>
+            </a:solidFill>
+            <a:prstDash val="solid"/>
+          </a:ln>
+        </p:spPr>
+      </p:sp>
+      <p:sp>
+        <p:nvSpPr>
+          <p:cNvPr id="10" name="Shape 8"/>
+          <p:cNvSpPr/>
+          <p:nvPr/>
+        </p:nvSpPr>
+        <p:spPr>
+          <a:xfrm>
+            <a:off x="2103120" y="1234440"/>
+            <a:ext cx="411480" cy="123444"/>
+          </a:xfrm>
+          <a:prstGeom prst="ellipse">
+            <a:avLst/>
+          </a:prstGeom>
+          <a:solidFill>
+            <a:srgbClr val="4C99E5"/>
+          </a:solidFill>
+          <a:ln w="12700">
+            <a:solidFill>
+              <a:srgbClr val="000000"/>
+            </a:solidFill>
+            <a:prstDash val="solid"/>
+          </a:ln>
+        </p:spPr>
+      </p:sp>
+      <p:sp>
+        <p:nvSpPr>
+          <p:cNvPr id="11" name="Shape 9"/>
+          <p:cNvSpPr/>
+          <p:nvPr/>
+        </p:nvSpPr>
+        <p:spPr>
+          <a:xfrm>
+            <a:off x="2103120" y="930402"/>
+            <a:ext cx="0" cy="365760"/>
+          </a:xfrm>
+          <a:prstGeom prst="line">
+            <a:avLst/>
+          </a:prstGeom>
+          <a:noFill/>
+          <a:ln w="12700">
+            <a:solidFill>
+              <a:srgbClr val="000000"/>
+            </a:solidFill>
+            <a:prstDash val="solid"/>
+          </a:ln>
+        </p:spPr>
+      </p:sp>
+      <p:sp>
+        <p:nvSpPr>
+          <p:cNvPr id="12" name="Shape 10"/>
+          <p:cNvSpPr/>
+          <p:nvPr/>
+        </p:nvSpPr>
+        <p:spPr>
+          <a:xfrm>
+            <a:off x="2514600" y="930402"/>
+            <a:ext cx="0" cy="365760"/>
+          </a:xfrm>
+          <a:prstGeom prst="line">
+            <a:avLst/>
+          </a:prstGeom>
+          <a:noFill/>
+          <a:ln w="12700">
+            <a:solidFill>
+              <a:srgbClr val="000000"/>
+            </a:solidFill>
+            <a:prstDash val="solid"/>
+          </a:ln>
+        </p:spPr>
+      </p:sp>
+      <p:sp>
+        <p:nvSpPr>
+          <p:cNvPr id="13" name="Text 11"/>
+          <p:cNvSpPr/>
+          <p:nvPr/>
+        </p:nvSpPr>
+        <p:spPr>
+          <a:xfrm>
+            <a:off x="2103120" y="1403604"/>
+            <a:ext cx="411480" cy="182880"/>
+          </a:xfrm>
+          <a:prstGeom prst="rect">
+            <a:avLst/>
+          </a:prstGeom>
+          <a:noFill/>
+          <a:ln/>
+        </p:spPr>
+        <p:txBody>
+          <a:bodyPr wrap="square" rtlCol="0" anchor="ctr"/>
+          <a:lstStyle/>
+          <a:p>
+            <a:pPr algn="ctr" indent="0" marL="0">
+              <a:buNone/>
+            </a:pPr>
+            <a:r>
+              <a:rPr lang="en-US" sz="1000" dirty="0">
+                <a:solidFill>
+                  <a:srgbClr val="E0E0E0"/>
+                </a:solidFill>
+              </a:rPr>
+              <a:t>Pot</a:t>
+            </a:r>
+            <a:endParaRPr lang="en-US" sz="1000" dirty="0"/>
+          </a:p>
+        </p:txBody>
+      </p:sp>
+      <p:sp>
+        <p:nvSpPr>
+          <p:cNvPr id="14" name="Shape 12"/>
+          <p:cNvSpPr/>
+          <p:nvPr/>
+        </p:nvSpPr>
+        <p:spPr>
+          <a:xfrm>
+            <a:off x="3566160" y="1234440"/>
+            <a:ext cx="411480" cy="123444"/>
+          </a:xfrm>
+          <a:prstGeom prst="ellipse">
+            <a:avLst/>
+          </a:prstGeom>
+          <a:solidFill>
+            <a:srgbClr val="4C99E5"/>
+          </a:solidFill>
+          <a:ln w="12700">
+            <a:solidFill>
+              <a:srgbClr val="000000"/>
+            </a:solidFill>
+            <a:prstDash val="solid"/>
+          </a:ln>
+        </p:spPr>
+      </p:sp>
+      <p:sp>
+        <p:nvSpPr>
+          <p:cNvPr id="15" name="Shape 13"/>
+          <p:cNvSpPr/>
+          <p:nvPr/>
+        </p:nvSpPr>
+        <p:spPr>
+          <a:xfrm flipV="1">
+            <a:off x="3566160" y="868680"/>
+            <a:ext cx="411480" cy="365760"/>
+          </a:xfrm>
+          <a:prstGeom prst="triangle">
+            <a:avLst/>
+          </a:prstGeom>
+          <a:solidFill>
+            <a:srgbClr val="66B3FF"/>
+          </a:solidFill>
+          <a:ln w="12700">
+            <a:solidFill>
+              <a:srgbClr val="000000"/>
+            </a:solidFill>
+            <a:prstDash val="solid"/>
+          </a:ln>
+        </p:spPr>
+      </p:sp>
+      <p:sp>
+        <p:nvSpPr>
+          <p:cNvPr id="16" name="Text 14"/>
+          <p:cNvSpPr/>
+          <p:nvPr/>
+        </p:nvSpPr>
+        <p:spPr>
+          <a:xfrm>
+            <a:off x="3566160" y="1403604"/>
+            <a:ext cx="411480" cy="182880"/>
+          </a:xfrm>
+          <a:prstGeom prst="rect">
+            <a:avLst/>
+          </a:prstGeom>
+          <a:noFill/>
+          <a:ln/>
+        </p:spPr>
+        <p:txBody>
+          <a:bodyPr wrap="square" rtlCol="0" anchor="ctr"/>
+          <a:lstStyle/>
+          <a:p>
+            <a:pPr algn="ctr" indent="0" marL="0">
+              <a:buNone/>
+            </a:pPr>
+            <a:r>
+              <a:rPr lang="en-US" sz="1000" dirty="0">
+                <a:solidFill>
+                  <a:srgbClr val="E0E0E0"/>
+                </a:solidFill>
+              </a:rPr>
+              <a:t>Shaker</a:t>
+            </a:r>
+            <a:endParaRPr lang="en-US" sz="1000" dirty="0"/>
+          </a:p>
+        </p:txBody>
+      </p:sp>
+      <p:sp>
+        <p:nvSpPr>
+          <p:cNvPr id="17" name="Shape 15"/>
+          <p:cNvSpPr/>
+          <p:nvPr/>
+        </p:nvSpPr>
+        <p:spPr>
+          <a:xfrm>
+            <a:off x="5029200" y="914400"/>
+            <a:ext cx="411480" cy="411480"/>
+          </a:xfrm>
+          <a:prstGeom prst="ellipse">
+            <a:avLst/>
+          </a:prstGeom>
+          <a:solidFill>
+            <a:srgbClr val="66B3FF"/>
+          </a:solidFill>
+          <a:ln w="12700">
+            <a:solidFill>
+              <a:srgbClr val="000000"/>
+            </a:solidFill>
+            <a:prstDash val="solid"/>
+          </a:ln>
+        </p:spPr>
+      </p:sp>
+      <p:sp>
+        <p:nvSpPr>
+          <p:cNvPr id="18" name="Shape 16"/>
+          <p:cNvSpPr/>
+          <p:nvPr/>
+        </p:nvSpPr>
+        <p:spPr>
+          <a:xfrm>
+            <a:off x="5090922" y="976122"/>
+            <a:ext cx="123444" cy="123444"/>
+          </a:xfrm>
+          <a:prstGeom prst="ellipse">
+            <a:avLst/>
+          </a:prstGeom>
+          <a:solidFill>
+            <a:srgbClr val="B3FFFF">
+              <a:alpha val="50000"/>
+            </a:srgbClr>
+          </a:solidFill>
+          <a:ln w="12700">
+            <a:solidFill>
+              <a:srgbClr val="333333"/>
+            </a:solidFill>
+            <a:prstDash val="solid"/>
+          </a:ln>
+        </p:spPr>
+      </p:sp>
+      <p:sp>
+        <p:nvSpPr>
+          <p:cNvPr id="19" name="Text 17"/>
+          <p:cNvSpPr/>
+          <p:nvPr/>
+        </p:nvSpPr>
+        <p:spPr>
+          <a:xfrm>
+            <a:off x="5029200" y="1371600"/>
+            <a:ext cx="411480" cy="182880"/>
+          </a:xfrm>
+          <a:prstGeom prst="rect">
+            <a:avLst/>
+          </a:prstGeom>
+          <a:noFill/>
+          <a:ln/>
+        </p:spPr>
+        <p:txBody>
+          <a:bodyPr wrap="square" rtlCol="0" anchor="ctr"/>
+          <a:lstStyle/>
+          <a:p>
+            <a:pPr algn="ctr" indent="0" marL="0">
+              <a:buNone/>
+            </a:pPr>
+            <a:r>
+              <a:rPr lang="en-US" sz="1000" dirty="0">
+                <a:solidFill>
+                  <a:srgbClr val="E0E0E0"/>
+                </a:solidFill>
+              </a:rPr>
+              <a:t>Cabbage</a:t>
+            </a:r>
+            <a:endParaRPr lang="en-US" sz="1000" dirty="0"/>
+          </a:p>
+        </p:txBody>
+      </p:sp>
+      <p:sp>
+        <p:nvSpPr>
+          <p:cNvPr id="20" name="Shape 18"/>
+          <p:cNvSpPr/>
+          <p:nvPr/>
+        </p:nvSpPr>
+        <p:spPr>
+          <a:xfrm>
+            <a:off x="6492240" y="1234440"/>
+            <a:ext cx="411480" cy="123444"/>
+          </a:xfrm>
+          <a:prstGeom prst="ellipse">
+            <a:avLst/>
+          </a:prstGeom>
+          <a:solidFill>
+            <a:srgbClr val="4C99E5"/>
+          </a:solidFill>
+          <a:ln w="12700">
+            <a:solidFill>
+              <a:srgbClr val="000000"/>
+            </a:solidFill>
+            <a:prstDash val="solid"/>
+          </a:ln>
+        </p:spPr>
+      </p:sp>
+      <p:sp>
+        <p:nvSpPr>
+          <p:cNvPr id="21" name="Shape 19"/>
+          <p:cNvSpPr/>
+          <p:nvPr/>
+        </p:nvSpPr>
+        <p:spPr>
+          <a:xfrm flipV="1">
+            <a:off x="6492240" y="868680"/>
+            <a:ext cx="411480" cy="365760"/>
+          </a:xfrm>
+          <a:prstGeom prst="triangle">
+            <a:avLst/>
+          </a:prstGeom>
+          <a:solidFill>
+            <a:srgbClr val="66B3FF"/>
+          </a:solidFill>
+          <a:ln w="12700">
+            <a:solidFill>
+              <a:srgbClr val="000000"/>
+            </a:solidFill>
+            <a:prstDash val="solid"/>
+          </a:ln>
+        </p:spPr>
+      </p:sp>
+      <p:sp>
+        <p:nvSpPr>
+          <p:cNvPr id="22" name="Text 20"/>
+          <p:cNvSpPr/>
+          <p:nvPr/>
+        </p:nvSpPr>
+        <p:spPr>
+          <a:xfrm>
+            <a:off x="6492240" y="1403604"/>
+            <a:ext cx="411480" cy="182880"/>
+          </a:xfrm>
+          <a:prstGeom prst="rect">
+            <a:avLst/>
+          </a:prstGeom>
+          <a:noFill/>
+          <a:ln/>
+        </p:spPr>
+        <p:txBody>
+          <a:bodyPr wrap="square" rtlCol="0" anchor="ctr"/>
+          <a:lstStyle/>
+          <a:p>
+            <a:pPr algn="ctr" indent="0" marL="0">
+              <a:buNone/>
+            </a:pPr>
+            <a:r>
+              <a:rPr lang="en-US" sz="1000" dirty="0">
+                <a:solidFill>
+                  <a:srgbClr val="E0E0E0"/>
+                </a:solidFill>
+              </a:rPr>
+              <a:t>Hat</a:t>
+            </a:r>
+            <a:endParaRPr lang="en-US" sz="1000" dirty="0"/>
+          </a:p>
+        </p:txBody>
+      </p:sp>
+      <p:sp>
+        <p:nvSpPr>
+          <p:cNvPr id="23" name="Shape 21"/>
+          <p:cNvSpPr/>
+          <p:nvPr/>
+        </p:nvSpPr>
+        <p:spPr>
+          <a:xfrm>
+            <a:off x="457200" y="2286000"/>
+            <a:ext cx="3840480" cy="685800"/>
           </a:xfrm>
           <a:prstGeom prst="rect">
             <a:avLst/>
@@ -3167,13 +2917,13 @@
       </p:sp>
       <p:sp>
         <p:nvSpPr>
-          <p:cNvPr id="6" name="Text 4"/>
-          <p:cNvSpPr/>
-          <p:nvPr/>
-        </p:nvSpPr>
-        <p:spPr>
-          <a:xfrm>
-            <a:off x="548640" y="1463040"/>
+          <p:cNvPr id="24" name="Text 22"/>
+          <p:cNvSpPr/>
+          <p:nvPr/>
+        </p:nvSpPr>
+        <p:spPr>
+          <a:xfrm>
+            <a:off x="548640" y="2377440"/>
             <a:ext cx="274320" cy="274320"/>
           </a:xfrm>
           <a:prstGeom prst="rect">
@@ -3205,14 +2955,14 @@
       </p:sp>
       <p:sp>
         <p:nvSpPr>
-          <p:cNvPr id="7" name="Text 5"/>
-          <p:cNvSpPr/>
-          <p:nvPr/>
-        </p:nvSpPr>
-        <p:spPr>
-          <a:xfrm>
-            <a:off x="914400" y="1508760"/>
-            <a:ext cx="3200400" cy="731520"/>
+          <p:cNvPr id="25" name="Text 23"/>
+          <p:cNvSpPr/>
+          <p:nvPr/>
+        </p:nvSpPr>
+        <p:spPr>
+          <a:xfrm>
+            <a:off x="914400" y="2468880"/>
+            <a:ext cx="3200400" cy="365760"/>
           </a:xfrm>
           <a:prstGeom prst="rect">
             <a:avLst/>
@@ -3224,31 +2974,31 @@
           <a:bodyPr wrap="square" rtlCol="0" anchor="ctr"/>
           <a:lstStyle/>
           <a:p>
-            <a:pPr indent="0" marL="0">
+            <a:pPr algn="l" indent="0" marL="0">
               <a:buNone/>
             </a:pPr>
             <a:r>
-              <a:rPr lang="en-US" sz="1100" dirty="0">
+              <a:rPr lang="en-US" sz="1300" dirty="0">
                 <a:solidFill>
                   <a:srgbClr val="888888"/>
                 </a:solidFill>
               </a:rPr>
-              <a:t>Box=Cube, Pot=Cylinder, Shaker=Cone, Cabbage=Sphere, Hat=Cone</a:t>
-            </a:r>
-            <a:endParaRPr lang="en-US" sz="1100" dirty="0"/>
-          </a:p>
-        </p:txBody>
-      </p:sp>
-      <p:sp>
-        <p:nvSpPr>
-          <p:cNvPr id="8" name="Shape 6"/>
-          <p:cNvSpPr/>
-          <p:nvPr/>
-        </p:nvSpPr>
-        <p:spPr>
-          <a:xfrm>
-            <a:off x="4754880" y="1371600"/>
-            <a:ext cx="3840480" cy="1005840"/>
+              <a:t>Cube, Cylinder, Cone, Sphere, Cone</a:t>
+            </a:r>
+            <a:endParaRPr lang="en-US" sz="1300" dirty="0"/>
+          </a:p>
+        </p:txBody>
+      </p:sp>
+      <p:sp>
+        <p:nvSpPr>
+          <p:cNvPr id="26" name="Shape 24"/>
+          <p:cNvSpPr/>
+          <p:nvPr/>
+        </p:nvSpPr>
+        <p:spPr>
+          <a:xfrm>
+            <a:off x="4754880" y="2286000"/>
+            <a:ext cx="3840480" cy="685800"/>
           </a:xfrm>
           <a:prstGeom prst="rect">
             <a:avLst/>
@@ -3266,13 +3016,13 @@
       </p:sp>
       <p:sp>
         <p:nvSpPr>
-          <p:cNvPr id="9" name="Text 7"/>
-          <p:cNvSpPr/>
-          <p:nvPr/>
-        </p:nvSpPr>
-        <p:spPr>
-          <a:xfrm>
-            <a:off x="4846320" y="1463040"/>
+          <p:cNvPr id="27" name="Text 25"/>
+          <p:cNvSpPr/>
+          <p:nvPr/>
+        </p:nvSpPr>
+        <p:spPr>
+          <a:xfrm>
+            <a:off x="4846320" y="2377440"/>
             <a:ext cx="274320" cy="274320"/>
           </a:xfrm>
           <a:prstGeom prst="rect">
@@ -3304,14 +3054,14 @@
       </p:sp>
       <p:sp>
         <p:nvSpPr>
-          <p:cNvPr id="10" name="Text 8"/>
-          <p:cNvSpPr/>
-          <p:nvPr/>
-        </p:nvSpPr>
-        <p:spPr>
-          <a:xfrm>
-            <a:off x="5212080" y="1508760"/>
-            <a:ext cx="3200400" cy="731520"/>
+          <p:cNvPr id="28" name="Text 26"/>
+          <p:cNvSpPr/>
+          <p:nvPr/>
+        </p:nvSpPr>
+        <p:spPr>
+          <a:xfrm>
+            <a:off x="5212080" y="2468880"/>
+            <a:ext cx="3200400" cy="365760"/>
           </a:xfrm>
           <a:prstGeom prst="rect">
             <a:avLst/>
@@ -3323,343 +3073,31 @@
           <a:bodyPr wrap="square" rtlCol="0" anchor="ctr"/>
           <a:lstStyle/>
           <a:p>
-            <a:pPr indent="0" marL="0">
+            <a:pPr algn="l" indent="0" marL="0">
               <a:buNone/>
             </a:pPr>
             <a:r>
-              <a:rPr lang="en-US" sz="1100" b="1" dirty="0">
+              <a:rPr lang="en-US" sz="1300" b="1" dirty="0">
                 <a:solidFill>
                   <a:srgbClr val="2ECC71"/>
                 </a:solidFill>
               </a:rPr>
-              <a:t>✓ Box=Rectangular Prism, Pot=Cylinder,</a:t>
-            </a:r>
-            <a:endParaRPr lang="en-US" sz="1100" dirty="0"/>
-          </a:p>
-          <a:p>
-            <a:pPr indent="0" marL="0">
-              <a:buNone/>
-            </a:pPr>
-            <a:r>
-              <a:rPr lang="en-US" sz="1100" b="1" dirty="0">
-                <a:solidFill>
-                  <a:srgbClr val="2ECC71"/>
-                </a:solidFill>
-              </a:rPr>
-              <a:t>Shaker=Cone, Cabbage=Sphere, Hat=Cone</a:t>
-            </a:r>
-            <a:endParaRPr lang="en-US" sz="1100" dirty="0"/>
-          </a:p>
-        </p:txBody>
-      </p:sp>
-      <p:sp>
-        <p:nvSpPr>
-          <p:cNvPr id="11" name="Shape 9"/>
-          <p:cNvSpPr/>
-          <p:nvPr/>
-        </p:nvSpPr>
-        <p:spPr>
-          <a:xfrm>
-            <a:off x="5303520" y="2020824"/>
-            <a:ext cx="365760" cy="274320"/>
-          </a:xfrm>
-          <a:prstGeom prst="rect">
-            <a:avLst/>
-          </a:prstGeom>
-          <a:solidFill>
-            <a:srgbClr val="66B3FF"/>
-          </a:solidFill>
-          <a:ln w="12700">
-            <a:solidFill>
-              <a:srgbClr val="000000"/>
-            </a:solidFill>
-            <a:prstDash val="solid"/>
-          </a:ln>
-        </p:spPr>
-      </p:sp>
-      <p:sp>
-        <p:nvSpPr>
-          <p:cNvPr id="12" name="Shape 10"/>
-          <p:cNvSpPr/>
-          <p:nvPr/>
-        </p:nvSpPr>
-        <p:spPr>
-          <a:xfrm>
-            <a:off x="5449824" y="1874520"/>
-            <a:ext cx="365760" cy="146304"/>
-          </a:xfrm>
-          <a:prstGeom prst="rect">
-            <a:avLst/>
-          </a:prstGeom>
-          <a:solidFill>
-            <a:srgbClr val="99E6FF"/>
-          </a:solidFill>
-          <a:ln w="12700">
-            <a:solidFill>
-              <a:srgbClr val="000000"/>
-            </a:solidFill>
-            <a:prstDash val="solid"/>
-          </a:ln>
-        </p:spPr>
-      </p:sp>
-      <p:sp>
-        <p:nvSpPr>
-          <p:cNvPr id="13" name="Shape 11"/>
-          <p:cNvSpPr/>
-          <p:nvPr/>
-        </p:nvSpPr>
-        <p:spPr>
-          <a:xfrm>
-            <a:off x="5669280" y="2020824"/>
-            <a:ext cx="146304" cy="274320"/>
-          </a:xfrm>
-          <a:prstGeom prst="rect">
-            <a:avLst/>
-          </a:prstGeom>
-          <a:solidFill>
-            <a:srgbClr val="3380CC"/>
-          </a:solidFill>
-          <a:ln w="12700">
-            <a:solidFill>
-              <a:srgbClr val="000000"/>
-            </a:solidFill>
-            <a:prstDash val="solid"/>
-          </a:ln>
-        </p:spPr>
-      </p:sp>
-      <p:sp>
-        <p:nvSpPr>
-          <p:cNvPr id="14" name="Shape 12"/>
-          <p:cNvSpPr/>
-          <p:nvPr/>
-        </p:nvSpPr>
-        <p:spPr>
-          <a:xfrm>
-            <a:off x="5852160" y="1828800"/>
-            <a:ext cx="274320" cy="82296"/>
-          </a:xfrm>
-          <a:prstGeom prst="ellipse">
-            <a:avLst/>
-          </a:prstGeom>
-          <a:solidFill>
-            <a:srgbClr val="99E6FF"/>
-          </a:solidFill>
-          <a:ln w="12700">
-            <a:solidFill>
-              <a:srgbClr val="000000"/>
-            </a:solidFill>
-            <a:prstDash val="solid"/>
-          </a:ln>
-        </p:spPr>
-      </p:sp>
-      <p:sp>
-        <p:nvSpPr>
-          <p:cNvPr id="15" name="Shape 13"/>
-          <p:cNvSpPr/>
-          <p:nvPr/>
-        </p:nvSpPr>
-        <p:spPr>
-          <a:xfrm>
-            <a:off x="5852160" y="1869948"/>
-            <a:ext cx="274320" cy="320040"/>
-          </a:xfrm>
-          <a:prstGeom prst="rect">
-            <a:avLst/>
-          </a:prstGeom>
-          <a:solidFill>
-            <a:srgbClr val="66B3FF"/>
-          </a:solidFill>
-          <a:ln w="12700">
-            <a:solidFill>
-              <a:srgbClr val="000000"/>
-            </a:solidFill>
-            <a:prstDash val="solid"/>
-          </a:ln>
-        </p:spPr>
-      </p:sp>
-      <p:sp>
-        <p:nvSpPr>
-          <p:cNvPr id="16" name="Shape 14"/>
-          <p:cNvSpPr/>
-          <p:nvPr/>
-        </p:nvSpPr>
-        <p:spPr>
-          <a:xfrm>
-            <a:off x="5852160" y="2148840"/>
-            <a:ext cx="274320" cy="82296"/>
-          </a:xfrm>
-          <a:prstGeom prst="ellipse">
-            <a:avLst/>
-          </a:prstGeom>
-          <a:solidFill>
-            <a:srgbClr val="4C99E5"/>
-          </a:solidFill>
-          <a:ln w="12700">
-            <a:solidFill>
-              <a:srgbClr val="000000"/>
-            </a:solidFill>
-            <a:prstDash val="solid"/>
-          </a:ln>
-        </p:spPr>
-      </p:sp>
-      <p:sp>
-        <p:nvSpPr>
-          <p:cNvPr id="17" name="Shape 15"/>
-          <p:cNvSpPr/>
-          <p:nvPr/>
-        </p:nvSpPr>
-        <p:spPr>
-          <a:xfrm>
-            <a:off x="5852160" y="1869948"/>
-            <a:ext cx="0" cy="320040"/>
-          </a:xfrm>
-          <a:prstGeom prst="line">
-            <a:avLst/>
-          </a:prstGeom>
-          <a:noFill/>
-          <a:ln w="12700">
-            <a:solidFill>
-              <a:srgbClr val="000000"/>
-            </a:solidFill>
-            <a:prstDash val="solid"/>
-          </a:ln>
-        </p:spPr>
-      </p:sp>
-      <p:sp>
-        <p:nvSpPr>
-          <p:cNvPr id="18" name="Shape 16"/>
-          <p:cNvSpPr/>
-          <p:nvPr/>
-        </p:nvSpPr>
-        <p:spPr>
-          <a:xfrm>
-            <a:off x="6126480" y="1869948"/>
-            <a:ext cx="0" cy="320040"/>
-          </a:xfrm>
-          <a:prstGeom prst="line">
-            <a:avLst/>
-          </a:prstGeom>
-          <a:noFill/>
-          <a:ln w="12700">
-            <a:solidFill>
-              <a:srgbClr val="000000"/>
-            </a:solidFill>
-            <a:prstDash val="solid"/>
-          </a:ln>
-        </p:spPr>
-      </p:sp>
-      <p:sp>
-        <p:nvSpPr>
-          <p:cNvPr id="19" name="Shape 17"/>
-          <p:cNvSpPr/>
-          <p:nvPr/>
-        </p:nvSpPr>
-        <p:spPr>
-          <a:xfrm>
-            <a:off x="6309360" y="2148840"/>
-            <a:ext cx="274320" cy="82296"/>
-          </a:xfrm>
-          <a:prstGeom prst="ellipse">
-            <a:avLst/>
-          </a:prstGeom>
-          <a:solidFill>
-            <a:srgbClr val="4C99E5"/>
-          </a:solidFill>
-          <a:ln w="12700">
-            <a:solidFill>
-              <a:srgbClr val="000000"/>
-            </a:solidFill>
-            <a:prstDash val="solid"/>
-          </a:ln>
-        </p:spPr>
-      </p:sp>
-      <p:sp>
-        <p:nvSpPr>
-          <p:cNvPr id="20" name="Shape 18"/>
-          <p:cNvSpPr/>
-          <p:nvPr/>
-        </p:nvSpPr>
-        <p:spPr>
-          <a:xfrm flipV="1">
-            <a:off x="6309360" y="1828800"/>
-            <a:ext cx="274320" cy="320040"/>
-          </a:xfrm>
-          <a:prstGeom prst="triangle">
-            <a:avLst/>
-          </a:prstGeom>
-          <a:solidFill>
-            <a:srgbClr val="66B3FF"/>
-          </a:solidFill>
-          <a:ln w="12700">
-            <a:solidFill>
-              <a:srgbClr val="000000"/>
-            </a:solidFill>
-            <a:prstDash val="solid"/>
-          </a:ln>
-        </p:spPr>
-      </p:sp>
-      <p:sp>
-        <p:nvSpPr>
-          <p:cNvPr id="21" name="Shape 19"/>
-          <p:cNvSpPr/>
-          <p:nvPr/>
-        </p:nvSpPr>
-        <p:spPr>
-          <a:xfrm>
-            <a:off x="6766560" y="1874520"/>
-            <a:ext cx="274320" cy="274320"/>
-          </a:xfrm>
-          <a:prstGeom prst="ellipse">
-            <a:avLst/>
-          </a:prstGeom>
-          <a:solidFill>
-            <a:srgbClr val="66B3FF"/>
-          </a:solidFill>
-          <a:ln w="12700">
-            <a:solidFill>
-              <a:srgbClr val="000000"/>
-            </a:solidFill>
-            <a:prstDash val="solid"/>
-          </a:ln>
-        </p:spPr>
-      </p:sp>
-      <p:sp>
-        <p:nvSpPr>
-          <p:cNvPr id="22" name="Shape 20"/>
-          <p:cNvSpPr/>
-          <p:nvPr/>
-        </p:nvSpPr>
-        <p:spPr>
-          <a:xfrm>
-            <a:off x="6807708" y="1915668"/>
-            <a:ext cx="82296" cy="82296"/>
-          </a:xfrm>
-          <a:prstGeom prst="ellipse">
-            <a:avLst/>
-          </a:prstGeom>
-          <a:solidFill>
-            <a:srgbClr val="B3FFFF">
-              <a:alpha val="50000"/>
-            </a:srgbClr>
-          </a:solidFill>
-          <a:ln w="12700">
-            <a:solidFill>
-              <a:srgbClr val="333333"/>
-            </a:solidFill>
-            <a:prstDash val="solid"/>
-          </a:ln>
-        </p:spPr>
-      </p:sp>
-      <p:sp>
-        <p:nvSpPr>
-          <p:cNvPr id="23" name="Shape 21"/>
-          <p:cNvSpPr/>
-          <p:nvPr/>
-        </p:nvSpPr>
-        <p:spPr>
-          <a:xfrm>
-            <a:off x="457200" y="2560320"/>
-            <a:ext cx="3840480" cy="1005840"/>
+              <a:t>✓ Rectangular Prism, Cylinder, Cone, Sphere, Cone</a:t>
+            </a:r>
+            <a:endParaRPr lang="en-US" sz="1300" dirty="0"/>
+          </a:p>
+        </p:txBody>
+      </p:sp>
+      <p:sp>
+        <p:nvSpPr>
+          <p:cNvPr id="29" name="Shape 27"/>
+          <p:cNvSpPr/>
+          <p:nvPr/>
+        </p:nvSpPr>
+        <p:spPr>
+          <a:xfrm>
+            <a:off x="457200" y="3154680"/>
+            <a:ext cx="3840480" cy="685800"/>
           </a:xfrm>
           <a:prstGeom prst="rect">
             <a:avLst/>
@@ -3677,13 +3115,13 @@
       </p:sp>
       <p:sp>
         <p:nvSpPr>
-          <p:cNvPr id="24" name="Text 22"/>
-          <p:cNvSpPr/>
-          <p:nvPr/>
-        </p:nvSpPr>
-        <p:spPr>
-          <a:xfrm>
-            <a:off x="548640" y="2651760"/>
+          <p:cNvPr id="30" name="Text 28"/>
+          <p:cNvSpPr/>
+          <p:nvPr/>
+        </p:nvSpPr>
+        <p:spPr>
+          <a:xfrm>
+            <a:off x="548640" y="3246120"/>
             <a:ext cx="274320" cy="274320"/>
           </a:xfrm>
           <a:prstGeom prst="rect">
@@ -3715,14 +3153,14 @@
       </p:sp>
       <p:sp>
         <p:nvSpPr>
-          <p:cNvPr id="25" name="Text 23"/>
-          <p:cNvSpPr/>
-          <p:nvPr/>
-        </p:nvSpPr>
-        <p:spPr>
-          <a:xfrm>
-            <a:off x="914400" y="2697480"/>
-            <a:ext cx="3200400" cy="731520"/>
+          <p:cNvPr id="31" name="Text 29"/>
+          <p:cNvSpPr/>
+          <p:nvPr/>
+        </p:nvSpPr>
+        <p:spPr>
+          <a:xfrm>
+            <a:off x="914400" y="3337560"/>
+            <a:ext cx="3200400" cy="365760"/>
           </a:xfrm>
           <a:prstGeom prst="rect">
             <a:avLst/>
@@ -3734,45 +3172,31 @@
           <a:bodyPr wrap="square" rtlCol="0" anchor="ctr"/>
           <a:lstStyle/>
           <a:p>
-            <a:pPr indent="0" marL="0">
+            <a:pPr algn="l" indent="0" marL="0">
               <a:buNone/>
             </a:pPr>
             <a:r>
-              <a:rPr lang="en-US" sz="1100" dirty="0">
+              <a:rPr lang="en-US" sz="1300" dirty="0">
                 <a:solidFill>
                   <a:srgbClr val="888888"/>
                 </a:solidFill>
               </a:rPr>
-              <a:t>Box=Rectangular Prism, Pot=Sphere,</a:t>
-            </a:r>
-            <a:endParaRPr lang="en-US" sz="1100" dirty="0"/>
-          </a:p>
-          <a:p>
-            <a:pPr indent="0" marL="0">
-              <a:buNone/>
-            </a:pPr>
-            <a:r>
-              <a:rPr lang="en-US" sz="1100" dirty="0">
-                <a:solidFill>
-                  <a:srgbClr val="888888"/>
-                </a:solidFill>
-              </a:rPr>
-              <a:t>Shaker=Cylinder, Cabbage=Cube, Hat=Cone</a:t>
-            </a:r>
-            <a:endParaRPr lang="en-US" sz="1100" dirty="0"/>
-          </a:p>
-        </p:txBody>
-      </p:sp>
-      <p:sp>
-        <p:nvSpPr>
-          <p:cNvPr id="26" name="Shape 24"/>
-          <p:cNvSpPr/>
-          <p:nvPr/>
-        </p:nvSpPr>
-        <p:spPr>
-          <a:xfrm>
-            <a:off x="4754880" y="2560320"/>
-            <a:ext cx="3840480" cy="1005840"/>
+              <a:t>Rectangular Prism, Sphere, Cylinder, Cube, Cone</a:t>
+            </a:r>
+            <a:endParaRPr lang="en-US" sz="1300" dirty="0"/>
+          </a:p>
+        </p:txBody>
+      </p:sp>
+      <p:sp>
+        <p:nvSpPr>
+          <p:cNvPr id="32" name="Shape 30"/>
+          <p:cNvSpPr/>
+          <p:nvPr/>
+        </p:nvSpPr>
+        <p:spPr>
+          <a:xfrm>
+            <a:off x="4754880" y="3154680"/>
+            <a:ext cx="3840480" cy="685800"/>
           </a:xfrm>
           <a:prstGeom prst="rect">
             <a:avLst/>
@@ -3790,13 +3214,13 @@
       </p:sp>
       <p:sp>
         <p:nvSpPr>
-          <p:cNvPr id="27" name="Text 25"/>
-          <p:cNvSpPr/>
-          <p:nvPr/>
-        </p:nvSpPr>
-        <p:spPr>
-          <a:xfrm>
-            <a:off x="4846320" y="2651760"/>
+          <p:cNvPr id="33" name="Text 31"/>
+          <p:cNvSpPr/>
+          <p:nvPr/>
+        </p:nvSpPr>
+        <p:spPr>
+          <a:xfrm>
+            <a:off x="4846320" y="3246120"/>
             <a:ext cx="274320" cy="274320"/>
           </a:xfrm>
           <a:prstGeom prst="rect">
@@ -3828,14 +3252,14 @@
       </p:sp>
       <p:sp>
         <p:nvSpPr>
-          <p:cNvPr id="28" name="Text 26"/>
-          <p:cNvSpPr/>
-          <p:nvPr/>
-        </p:nvSpPr>
-        <p:spPr>
-          <a:xfrm>
-            <a:off x="5212080" y="2697480"/>
-            <a:ext cx="3200400" cy="731520"/>
+          <p:cNvPr id="34" name="Text 32"/>
+          <p:cNvSpPr/>
+          <p:nvPr/>
+        </p:nvSpPr>
+        <p:spPr>
+          <a:xfrm>
+            <a:off x="5212080" y="3337560"/>
+            <a:ext cx="3200400" cy="365760"/>
           </a:xfrm>
           <a:prstGeom prst="rect">
             <a:avLst/>
@@ -3847,38 +3271,24 @@
           <a:bodyPr wrap="square" rtlCol="0" anchor="ctr"/>
           <a:lstStyle/>
           <a:p>
-            <a:pPr indent="0" marL="0">
+            <a:pPr algn="l" indent="0" marL="0">
               <a:buNone/>
             </a:pPr>
             <a:r>
-              <a:rPr lang="en-US" sz="1100" dirty="0">
+              <a:rPr lang="en-US" sz="1300" dirty="0">
                 <a:solidFill>
                   <a:srgbClr val="888888"/>
                 </a:solidFill>
               </a:rPr>
-              <a:t>Box=Cube, Pot=Cylinder, Shaker=Cube,</a:t>
-            </a:r>
-            <a:endParaRPr lang="en-US" sz="1100" dirty="0"/>
-          </a:p>
-          <a:p>
-            <a:pPr indent="0" marL="0">
-              <a:buNone/>
-            </a:pPr>
-            <a:r>
-              <a:rPr lang="en-US" sz="1100" dirty="0">
-                <a:solidFill>
-                  <a:srgbClr val="888888"/>
-                </a:solidFill>
-              </a:rPr>
-              <a:t>Cabbage=Ball, Hat=Triangle</a:t>
-            </a:r>
-            <a:endParaRPr lang="en-US" sz="1100" dirty="0"/>
-          </a:p>
-        </p:txBody>
-      </p:sp>
-      <p:sp>
-        <p:nvSpPr>
-          <p:cNvPr id="29" name="Shape 27"/>
+              <a:t>Cube, Cylinder, Cube, Ball, Triangle</a:t>
+            </a:r>
+            <a:endParaRPr lang="en-US" sz="1300" dirty="0"/>
+          </a:p>
+        </p:txBody>
+      </p:sp>
+      <p:sp>
+        <p:nvSpPr>
+          <p:cNvPr id="35" name="Shape 33"/>
           <p:cNvSpPr/>
           <p:nvPr/>
         </p:nvSpPr>
@@ -3903,7 +3313,7 @@
       </p:sp>
       <p:sp>
         <p:nvSpPr>
-          <p:cNvPr id="30" name="Text 28">
+          <p:cNvPr id="36" name="Text 34">
             <a:hlinkClick r:id="rId1" tooltip="" action="ppaction://hlinksldjump"/>
           </p:cNvPr>
           <p:cNvSpPr/>
@@ -4383,10 +3793,10 @@
         </p:nvSpPr>
         <p:spPr>
           <a:xfrm>
-            <a:off x="5943600" y="2057400"/>
-            <a:ext cx="548640" cy="365760"/>
-          </a:xfrm>
-          <a:prstGeom prst="rect">
+            <a:off x="6053328" y="1755648"/>
+            <a:ext cx="137160" cy="137160"/>
+          </a:xfrm>
+          <a:prstGeom prst="triangle">
             <a:avLst/>
           </a:prstGeom>
           <a:solidFill>
@@ -4408,7 +3818,7 @@
         </p:nvSpPr>
         <p:spPr>
           <a:xfrm>
-            <a:off x="5989320" y="1783080"/>
+            <a:off x="6199632" y="1755648"/>
             <a:ext cx="137160" cy="137160"/>
           </a:xfrm>
           <a:prstGeom prst="triangle">
@@ -4433,10 +3843,10 @@
         </p:nvSpPr>
         <p:spPr>
           <a:xfrm>
-            <a:off x="6217920" y="1783080"/>
-            <a:ext cx="137160" cy="137160"/>
-          </a:xfrm>
-          <a:prstGeom prst="triangle">
+            <a:off x="5943600" y="2084832"/>
+            <a:ext cx="548640" cy="320040"/>
+          </a:xfrm>
+          <a:prstGeom prst="rect">
             <a:avLst/>
           </a:prstGeom>
           <a:solidFill>
@@ -4459,7 +3869,7 @@
         <p:spPr>
           <a:xfrm>
             <a:off x="5989320" y="2377440"/>
-            <a:ext cx="109728" cy="228600"/>
+            <a:ext cx="91440" cy="274320"/>
           </a:xfrm>
           <a:prstGeom prst="rect">
             <a:avLst/>
@@ -4483,8 +3893,8 @@
         </p:nvSpPr>
         <p:spPr>
           <a:xfrm>
-            <a:off x="6309360" y="2377440"/>
-            <a:ext cx="109728" cy="228600"/>
+            <a:off x="6126480" y="2377440"/>
+            <a:ext cx="91440" cy="274320"/>
           </a:xfrm>
           <a:prstGeom prst="rect">
             <a:avLst/>
@@ -4503,6 +3913,56 @@
       <p:sp>
         <p:nvSpPr>
           <p:cNvPr id="20" name="Shape 18"/>
+          <p:cNvSpPr/>
+          <p:nvPr/>
+        </p:nvSpPr>
+        <p:spPr>
+          <a:xfrm>
+            <a:off x="6217920" y="2377440"/>
+            <a:ext cx="91440" cy="274320"/>
+          </a:xfrm>
+          <a:prstGeom prst="rect">
+            <a:avLst/>
+          </a:prstGeom>
+          <a:solidFill>
+            <a:srgbClr val="66B3FF"/>
+          </a:solidFill>
+          <a:ln w="12700">
+            <a:solidFill>
+              <a:srgbClr val="000000"/>
+            </a:solidFill>
+            <a:prstDash val="solid"/>
+          </a:ln>
+        </p:spPr>
+      </p:sp>
+      <p:sp>
+        <p:nvSpPr>
+          <p:cNvPr id="21" name="Shape 19"/>
+          <p:cNvSpPr/>
+          <p:nvPr/>
+        </p:nvSpPr>
+        <p:spPr>
+          <a:xfrm>
+            <a:off x="6355080" y="2377440"/>
+            <a:ext cx="91440" cy="274320"/>
+          </a:xfrm>
+          <a:prstGeom prst="rect">
+            <a:avLst/>
+          </a:prstGeom>
+          <a:solidFill>
+            <a:srgbClr val="66B3FF"/>
+          </a:solidFill>
+          <a:ln w="12700">
+            <a:solidFill>
+              <a:srgbClr val="000000"/>
+            </a:solidFill>
+            <a:prstDash val="solid"/>
+          </a:ln>
+        </p:spPr>
+      </p:sp>
+      <p:sp>
+        <p:nvSpPr>
+          <p:cNvPr id="22" name="Shape 20"/>
           <p:cNvSpPr/>
           <p:nvPr/>
         </p:nvSpPr>
@@ -4527,7 +3987,7 @@
       </p:sp>
       <p:sp>
         <p:nvSpPr>
-          <p:cNvPr id="21" name="Text 19"/>
+          <p:cNvPr id="23" name="Text 21"/>
           <p:cNvSpPr/>
           <p:nvPr/>
         </p:nvSpPr>
@@ -4565,7 +4025,7 @@
       </p:sp>
       <p:sp>
         <p:nvSpPr>
-          <p:cNvPr id="22" name="Text 20"/>
+          <p:cNvPr id="24" name="Text 22"/>
           <p:cNvSpPr/>
           <p:nvPr/>
         </p:nvSpPr>
@@ -4601,7 +4061,7 @@
       </p:sp>
       <p:sp>
         <p:nvSpPr>
-          <p:cNvPr id="23" name="Shape 21"/>
+          <p:cNvPr id="25" name="Shape 23"/>
           <p:cNvSpPr/>
           <p:nvPr/>
         </p:nvSpPr>
@@ -4626,7 +4086,7 @@
       </p:sp>
       <p:sp>
         <p:nvSpPr>
-          <p:cNvPr id="24" name="Shape 22"/>
+          <p:cNvPr id="26" name="Shape 24"/>
           <p:cNvSpPr/>
           <p:nvPr/>
         </p:nvSpPr>
@@ -4651,7 +4111,7 @@
       </p:sp>
       <p:sp>
         <p:nvSpPr>
-          <p:cNvPr id="25" name="Shape 23"/>
+          <p:cNvPr id="27" name="Shape 25"/>
           <p:cNvSpPr/>
           <p:nvPr/>
         </p:nvSpPr>
@@ -4676,7 +4136,7 @@
       </p:sp>
       <p:sp>
         <p:nvSpPr>
-          <p:cNvPr id="26" name="Shape 24"/>
+          <p:cNvPr id="28" name="Shape 26"/>
           <p:cNvSpPr/>
           <p:nvPr/>
         </p:nvSpPr>
@@ -4701,7 +4161,7 @@
       </p:sp>
       <p:sp>
         <p:nvSpPr>
-          <p:cNvPr id="27" name="Shape 25"/>
+          <p:cNvPr id="29" name="Shape 27"/>
           <p:cNvSpPr/>
           <p:nvPr/>
         </p:nvSpPr>
@@ -4726,7 +4186,7 @@
       </p:sp>
       <p:sp>
         <p:nvSpPr>
-          <p:cNvPr id="28" name="Text 26"/>
+          <p:cNvPr id="30" name="Text 28"/>
           <p:cNvSpPr/>
           <p:nvPr/>
         </p:nvSpPr>
@@ -4764,7 +4224,7 @@
       </p:sp>
       <p:sp>
         <p:nvSpPr>
-          <p:cNvPr id="29" name="Text 27"/>
+          <p:cNvPr id="31" name="Text 29"/>
           <p:cNvSpPr/>
           <p:nvPr/>
         </p:nvSpPr>
@@ -4800,7 +4260,7 @@
       </p:sp>
       <p:sp>
         <p:nvSpPr>
-          <p:cNvPr id="30" name="Shape 28"/>
+          <p:cNvPr id="32" name="Shape 30"/>
           <p:cNvSpPr/>
           <p:nvPr/>
         </p:nvSpPr>
@@ -4825,7 +4285,7 @@
       </p:sp>
       <p:sp>
         <p:nvSpPr>
-          <p:cNvPr id="31" name="Shape 29"/>
+          <p:cNvPr id="33" name="Shape 31"/>
           <p:cNvSpPr/>
           <p:nvPr/>
         </p:nvSpPr>
@@ -4850,7 +4310,7 @@
       </p:sp>
       <p:sp>
         <p:nvSpPr>
-          <p:cNvPr id="32" name="Shape 30"/>
+          <p:cNvPr id="34" name="Shape 32"/>
           <p:cNvSpPr/>
           <p:nvPr/>
         </p:nvSpPr>
@@ -4875,7 +4335,7 @@
       </p:sp>
       <p:sp>
         <p:nvSpPr>
-          <p:cNvPr id="33" name="Shape 31">
+          <p:cNvPr id="35" name="Shape 33">
             <a:hlinkClick r:id="rId1" tooltip="" action="ppaction://hlinksldjump"/>
           </p:cNvPr>
           <p:cNvSpPr/>
@@ -4904,7 +4364,7 @@
       </p:sp>
       <p:sp>
         <p:nvSpPr>
-          <p:cNvPr id="34" name="Shape 32">
+          <p:cNvPr id="36" name="Shape 34">
             <a:hlinkClick r:id="rId2" tooltip="" action="ppaction://hlinksldjump"/>
           </p:cNvPr>
           <p:cNvSpPr/>
@@ -4933,7 +4393,7 @@
       </p:sp>
       <p:sp>
         <p:nvSpPr>
-          <p:cNvPr id="35" name="Shape 33">
+          <p:cNvPr id="37" name="Shape 35">
             <a:hlinkClick r:id="rId3" tooltip="" action="ppaction://hlinksldjump"/>
           </p:cNvPr>
           <p:cNvSpPr/>
@@ -4962,7 +4422,7 @@
       </p:sp>
       <p:sp>
         <p:nvSpPr>
-          <p:cNvPr id="36" name="Shape 34">
+          <p:cNvPr id="38" name="Shape 36">
             <a:hlinkClick r:id="rId4" tooltip="" action="ppaction://hlinksldjump"/>
           </p:cNvPr>
           <p:cNvSpPr/>
@@ -5326,10 +4786,10 @@
         </p:nvSpPr>
         <p:spPr>
           <a:xfrm>
-            <a:off x="5943600" y="2057400"/>
-            <a:ext cx="548640" cy="365760"/>
-          </a:xfrm>
-          <a:prstGeom prst="rect">
+            <a:off x="6053328" y="1755648"/>
+            <a:ext cx="137160" cy="137160"/>
+          </a:xfrm>
+          <a:prstGeom prst="triangle">
             <a:avLst/>
           </a:prstGeom>
           <a:solidFill>
@@ -5351,7 +4811,7 @@
         </p:nvSpPr>
         <p:spPr>
           <a:xfrm>
-            <a:off x="5989320" y="1783080"/>
+            <a:off x="6199632" y="1755648"/>
             <a:ext cx="137160" cy="137160"/>
           </a:xfrm>
           <a:prstGeom prst="triangle">
@@ -5376,10 +4836,10 @@
         </p:nvSpPr>
         <p:spPr>
           <a:xfrm>
-            <a:off x="6217920" y="1783080"/>
-            <a:ext cx="137160" cy="137160"/>
-          </a:xfrm>
-          <a:prstGeom prst="triangle">
+            <a:off x="5943600" y="2084832"/>
+            <a:ext cx="548640" cy="320040"/>
+          </a:xfrm>
+          <a:prstGeom prst="rect">
             <a:avLst/>
           </a:prstGeom>
           <a:solidFill>
@@ -5402,7 +4862,7 @@
         <p:spPr>
           <a:xfrm>
             <a:off x="5989320" y="2377440"/>
-            <a:ext cx="109728" cy="228600"/>
+            <a:ext cx="91440" cy="274320"/>
           </a:xfrm>
           <a:prstGeom prst="rect">
             <a:avLst/>
@@ -5426,8 +4886,8 @@
         </p:nvSpPr>
         <p:spPr>
           <a:xfrm>
-            <a:off x="6309360" y="2377440"/>
-            <a:ext cx="109728" cy="228600"/>
+            <a:off x="6126480" y="2377440"/>
+            <a:ext cx="91440" cy="274320"/>
           </a:xfrm>
           <a:prstGeom prst="rect">
             <a:avLst/>
@@ -5446,6 +4906,56 @@
       <p:sp>
         <p:nvSpPr>
           <p:cNvPr id="16" name="Shape 14"/>
+          <p:cNvSpPr/>
+          <p:nvPr/>
+        </p:nvSpPr>
+        <p:spPr>
+          <a:xfrm>
+            <a:off x="6217920" y="2377440"/>
+            <a:ext cx="91440" cy="274320"/>
+          </a:xfrm>
+          <a:prstGeom prst="rect">
+            <a:avLst/>
+          </a:prstGeom>
+          <a:solidFill>
+            <a:srgbClr val="66B3FF"/>
+          </a:solidFill>
+          <a:ln w="12700">
+            <a:solidFill>
+              <a:srgbClr val="000000"/>
+            </a:solidFill>
+            <a:prstDash val="solid"/>
+          </a:ln>
+        </p:spPr>
+      </p:sp>
+      <p:sp>
+        <p:nvSpPr>
+          <p:cNvPr id="17" name="Shape 15"/>
+          <p:cNvSpPr/>
+          <p:nvPr/>
+        </p:nvSpPr>
+        <p:spPr>
+          <a:xfrm>
+            <a:off x="6355080" y="2377440"/>
+            <a:ext cx="91440" cy="274320"/>
+          </a:xfrm>
+          <a:prstGeom prst="rect">
+            <a:avLst/>
+          </a:prstGeom>
+          <a:solidFill>
+            <a:srgbClr val="66B3FF"/>
+          </a:solidFill>
+          <a:ln w="12700">
+            <a:solidFill>
+              <a:srgbClr val="000000"/>
+            </a:solidFill>
+            <a:prstDash val="solid"/>
+          </a:ln>
+        </p:spPr>
+      </p:sp>
+      <p:sp>
+        <p:nvSpPr>
+          <p:cNvPr id="18" name="Shape 16"/>
           <p:cNvSpPr/>
           <p:nvPr/>
         </p:nvSpPr>
@@ -5470,7 +4980,7 @@
       </p:sp>
       <p:sp>
         <p:nvSpPr>
-          <p:cNvPr id="17" name="Text 15"/>
+          <p:cNvPr id="19" name="Text 17"/>
           <p:cNvSpPr/>
           <p:nvPr/>
         </p:nvSpPr>
@@ -5508,7 +5018,7 @@
       </p:sp>
       <p:sp>
         <p:nvSpPr>
-          <p:cNvPr id="18" name="Text 16"/>
+          <p:cNvPr id="20" name="Text 18"/>
           <p:cNvSpPr/>
           <p:nvPr/>
         </p:nvSpPr>
@@ -5544,7 +5054,7 @@
       </p:sp>
       <p:sp>
         <p:nvSpPr>
-          <p:cNvPr id="19" name="Shape 17"/>
+          <p:cNvPr id="21" name="Shape 19"/>
           <p:cNvSpPr/>
           <p:nvPr/>
         </p:nvSpPr>
@@ -5569,7 +5079,7 @@
       </p:sp>
       <p:sp>
         <p:nvSpPr>
-          <p:cNvPr id="20" name="Text 18"/>
+          <p:cNvPr id="22" name="Text 20"/>
           <p:cNvSpPr/>
           <p:nvPr/>
         </p:nvSpPr>
@@ -5607,7 +5117,7 @@
       </p:sp>
       <p:sp>
         <p:nvSpPr>
-          <p:cNvPr id="21" name="Text 19"/>
+          <p:cNvPr id="23" name="Text 21"/>
           <p:cNvSpPr/>
           <p:nvPr/>
         </p:nvSpPr>
@@ -5643,7 +5153,7 @@
       </p:sp>
       <p:sp>
         <p:nvSpPr>
-          <p:cNvPr id="22" name="Shape 20"/>
+          <p:cNvPr id="24" name="Shape 22"/>
           <p:cNvSpPr/>
           <p:nvPr/>
         </p:nvSpPr>
@@ -5668,7 +5178,7 @@
       </p:sp>
       <p:sp>
         <p:nvSpPr>
-          <p:cNvPr id="23" name="Text 21">
+          <p:cNvPr id="25" name="Text 23">
             <a:hlinkClick r:id="rId1" tooltip="" action="ppaction://hlinksldjump"/>
           </p:cNvPr>
           <p:cNvSpPr/>

</xml_diff>